<commit_message>
windows ionic dev build
</commit_message>
<xml_diff>
--- a/ionic/ionic.pptx
+++ b/ionic/ionic.pptx
@@ -6,10 +6,10 @@
     <p:sldMasterId id="2147483655" r:id="rId2"/>
   </p:sldMasterIdLst>
   <p:notesMasterIdLst>
-    <p:notesMasterId r:id="rId13"/>
+    <p:notesMasterId r:id="rId17"/>
   </p:notesMasterIdLst>
   <p:handoutMasterIdLst>
-    <p:handoutMasterId r:id="rId14"/>
+    <p:handoutMasterId r:id="rId18"/>
   </p:handoutMasterIdLst>
   <p:sldIdLst>
     <p:sldId id="449" r:id="rId3"/>
@@ -18,10 +18,14 @@
     <p:sldId id="514" r:id="rId6"/>
     <p:sldId id="513" r:id="rId7"/>
     <p:sldId id="515" r:id="rId8"/>
-    <p:sldId id="516" r:id="rId9"/>
-    <p:sldId id="517" r:id="rId10"/>
-    <p:sldId id="508" r:id="rId11"/>
-    <p:sldId id="465" r:id="rId12"/>
+    <p:sldId id="522" r:id="rId9"/>
+    <p:sldId id="516" r:id="rId10"/>
+    <p:sldId id="517" r:id="rId11"/>
+    <p:sldId id="521" r:id="rId12"/>
+    <p:sldId id="519" r:id="rId13"/>
+    <p:sldId id="520" r:id="rId14"/>
+    <p:sldId id="508" r:id="rId15"/>
+    <p:sldId id="465" r:id="rId16"/>
   </p:sldIdLst>
   <p:sldSz cx="11522075" cy="6483350"/>
   <p:notesSz cx="6858000" cy="9144000"/>
@@ -245,7 +249,7 @@
           <a:p>
             <a:fld id="{2D221E8D-25D8-AF4C-A093-C2A82D5E84AD}" type="datetimeFigureOut">
               <a:rPr kumimoji="1" lang="zh-CN" altLang="en-US" smtClean="0"/>
-              <a:t>2018/3/4</a:t>
+              <a:t>2018/3/5</a:t>
             </a:fld>
             <a:endParaRPr kumimoji="1" lang="zh-CN" altLang="en-US"/>
           </a:p>
@@ -410,7 +414,7 @@
           <a:p>
             <a:fld id="{FFB42849-82B9-482D-AFE1-E5E990AEC528}" type="datetimeFigureOut">
               <a:rPr lang="zh-CN" altLang="en-US" smtClean="0"/>
-              <a:t>2018/3/4</a:t>
+              <a:t>2018/3/5</a:t>
             </a:fld>
             <a:endParaRPr lang="zh-CN" altLang="en-US"/>
           </a:p>
@@ -817,6 +821,342 @@
             <p:ph type="sldImg"/>
           </p:nvPr>
         </p:nvSpPr>
+        <p:spPr/>
+      </p:sp>
+      <p:sp>
+        <p:nvSpPr>
+          <p:cNvPr id="3" name="备注占位符 2"/>
+          <p:cNvSpPr>
+            <a:spLocks noGrp="1"/>
+          </p:cNvSpPr>
+          <p:nvPr>
+            <p:ph type="body" idx="1"/>
+          </p:nvPr>
+        </p:nvSpPr>
+        <p:spPr/>
+        <p:txBody>
+          <a:bodyPr/>
+          <a:lstStyle/>
+          <a:p>
+            <a:endParaRPr kumimoji="1" lang="zh-CN" altLang="en-US" dirty="0"/>
+          </a:p>
+        </p:txBody>
+      </p:sp>
+      <p:sp>
+        <p:nvSpPr>
+          <p:cNvPr id="4" name="幻灯片编号占位符 3"/>
+          <p:cNvSpPr>
+            <a:spLocks noGrp="1"/>
+          </p:cNvSpPr>
+          <p:nvPr>
+            <p:ph type="sldNum" sz="quarter" idx="10"/>
+          </p:nvPr>
+        </p:nvSpPr>
+        <p:spPr/>
+        <p:txBody>
+          <a:bodyPr/>
+          <a:lstStyle/>
+          <a:p>
+            <a:fld id="{EEC43D9F-348C-4EFA-BA8C-BCBE316224D1}" type="slidenum">
+              <a:rPr lang="zh-CN" altLang="en-US" smtClean="0"/>
+              <a:t>10</a:t>
+            </a:fld>
+            <a:endParaRPr lang="zh-CN" altLang="en-US"/>
+          </a:p>
+        </p:txBody>
+      </p:sp>
+    </p:spTree>
+    <p:extLst>
+      <p:ext uri="{BB962C8B-B14F-4D97-AF65-F5344CB8AC3E}">
+        <p14:creationId xmlns:p14="http://schemas.microsoft.com/office/powerpoint/2010/main" val="195370370"/>
+      </p:ext>
+    </p:extLst>
+  </p:cSld>
+  <p:clrMapOvr>
+    <a:masterClrMapping/>
+  </p:clrMapOvr>
+</p:notes>
+</file>
+
+<file path=ppt/notesSlides/notesSlide11.xml><?xml version="1.0" encoding="utf-8"?>
+<p:notes xmlns:a="http://schemas.openxmlformats.org/drawingml/2006/main" xmlns:r="http://schemas.openxmlformats.org/officeDocument/2006/relationships" xmlns:p="http://schemas.openxmlformats.org/presentationml/2006/main">
+  <p:cSld>
+    <p:spTree>
+      <p:nvGrpSpPr>
+        <p:cNvPr id="1" name=""/>
+        <p:cNvGrpSpPr/>
+        <p:nvPr/>
+      </p:nvGrpSpPr>
+      <p:grpSpPr>
+        <a:xfrm>
+          <a:off x="0" y="0"/>
+          <a:ext cx="0" cy="0"/>
+          <a:chOff x="0" y="0"/>
+          <a:chExt cx="0" cy="0"/>
+        </a:xfrm>
+      </p:grpSpPr>
+      <p:sp>
+        <p:nvSpPr>
+          <p:cNvPr id="2" name="幻灯片图像占位符 1"/>
+          <p:cNvSpPr>
+            <a:spLocks noGrp="1" noRot="1" noChangeAspect="1"/>
+          </p:cNvSpPr>
+          <p:nvPr>
+            <p:ph type="sldImg"/>
+          </p:nvPr>
+        </p:nvSpPr>
+        <p:spPr/>
+      </p:sp>
+      <p:sp>
+        <p:nvSpPr>
+          <p:cNvPr id="3" name="备注占位符 2"/>
+          <p:cNvSpPr>
+            <a:spLocks noGrp="1"/>
+          </p:cNvSpPr>
+          <p:nvPr>
+            <p:ph type="body" idx="1"/>
+          </p:nvPr>
+        </p:nvSpPr>
+        <p:spPr/>
+        <p:txBody>
+          <a:bodyPr/>
+          <a:lstStyle/>
+          <a:p>
+            <a:endParaRPr kumimoji="1" lang="zh-CN" altLang="en-US" dirty="0"/>
+          </a:p>
+        </p:txBody>
+      </p:sp>
+      <p:sp>
+        <p:nvSpPr>
+          <p:cNvPr id="4" name="幻灯片编号占位符 3"/>
+          <p:cNvSpPr>
+            <a:spLocks noGrp="1"/>
+          </p:cNvSpPr>
+          <p:nvPr>
+            <p:ph type="sldNum" sz="quarter" idx="10"/>
+          </p:nvPr>
+        </p:nvSpPr>
+        <p:spPr/>
+        <p:txBody>
+          <a:bodyPr/>
+          <a:lstStyle/>
+          <a:p>
+            <a:fld id="{EEC43D9F-348C-4EFA-BA8C-BCBE316224D1}" type="slidenum">
+              <a:rPr lang="zh-CN" altLang="en-US" smtClean="0"/>
+              <a:t>11</a:t>
+            </a:fld>
+            <a:endParaRPr lang="zh-CN" altLang="en-US"/>
+          </a:p>
+        </p:txBody>
+      </p:sp>
+    </p:spTree>
+    <p:extLst>
+      <p:ext uri="{BB962C8B-B14F-4D97-AF65-F5344CB8AC3E}">
+        <p14:creationId xmlns:p14="http://schemas.microsoft.com/office/powerpoint/2010/main" val="854060330"/>
+      </p:ext>
+    </p:extLst>
+  </p:cSld>
+  <p:clrMapOvr>
+    <a:masterClrMapping/>
+  </p:clrMapOvr>
+</p:notes>
+</file>
+
+<file path=ppt/notesSlides/notesSlide12.xml><?xml version="1.0" encoding="utf-8"?>
+<p:notes xmlns:a="http://schemas.openxmlformats.org/drawingml/2006/main" xmlns:r="http://schemas.openxmlformats.org/officeDocument/2006/relationships" xmlns:p="http://schemas.openxmlformats.org/presentationml/2006/main">
+  <p:cSld>
+    <p:spTree>
+      <p:nvGrpSpPr>
+        <p:cNvPr id="1" name=""/>
+        <p:cNvGrpSpPr/>
+        <p:nvPr/>
+      </p:nvGrpSpPr>
+      <p:grpSpPr>
+        <a:xfrm>
+          <a:off x="0" y="0"/>
+          <a:ext cx="0" cy="0"/>
+          <a:chOff x="0" y="0"/>
+          <a:chExt cx="0" cy="0"/>
+        </a:xfrm>
+      </p:grpSpPr>
+      <p:sp>
+        <p:nvSpPr>
+          <p:cNvPr id="2" name="幻灯片图像占位符 1"/>
+          <p:cNvSpPr>
+            <a:spLocks noGrp="1" noRot="1" noChangeAspect="1"/>
+          </p:cNvSpPr>
+          <p:nvPr>
+            <p:ph type="sldImg"/>
+          </p:nvPr>
+        </p:nvSpPr>
+        <p:spPr/>
+      </p:sp>
+      <p:sp>
+        <p:nvSpPr>
+          <p:cNvPr id="3" name="备注占位符 2"/>
+          <p:cNvSpPr>
+            <a:spLocks noGrp="1"/>
+          </p:cNvSpPr>
+          <p:nvPr>
+            <p:ph type="body" idx="1"/>
+          </p:nvPr>
+        </p:nvSpPr>
+        <p:spPr/>
+        <p:txBody>
+          <a:bodyPr/>
+          <a:lstStyle/>
+          <a:p>
+            <a:endParaRPr kumimoji="1" lang="zh-CN" altLang="en-US" dirty="0"/>
+          </a:p>
+        </p:txBody>
+      </p:sp>
+      <p:sp>
+        <p:nvSpPr>
+          <p:cNvPr id="4" name="幻灯片编号占位符 3"/>
+          <p:cNvSpPr>
+            <a:spLocks noGrp="1"/>
+          </p:cNvSpPr>
+          <p:nvPr>
+            <p:ph type="sldNum" sz="quarter" idx="10"/>
+          </p:nvPr>
+        </p:nvSpPr>
+        <p:spPr/>
+        <p:txBody>
+          <a:bodyPr/>
+          <a:lstStyle/>
+          <a:p>
+            <a:fld id="{EEC43D9F-348C-4EFA-BA8C-BCBE316224D1}" type="slidenum">
+              <a:rPr lang="zh-CN" altLang="en-US" smtClean="0"/>
+              <a:t>12</a:t>
+            </a:fld>
+            <a:endParaRPr lang="zh-CN" altLang="en-US"/>
+          </a:p>
+        </p:txBody>
+      </p:sp>
+    </p:spTree>
+    <p:extLst>
+      <p:ext uri="{BB962C8B-B14F-4D97-AF65-F5344CB8AC3E}">
+        <p14:creationId xmlns:p14="http://schemas.microsoft.com/office/powerpoint/2010/main" val="1166105164"/>
+      </p:ext>
+    </p:extLst>
+  </p:cSld>
+  <p:clrMapOvr>
+    <a:masterClrMapping/>
+  </p:clrMapOvr>
+</p:notes>
+</file>
+
+<file path=ppt/notesSlides/notesSlide13.xml><?xml version="1.0" encoding="utf-8"?>
+<p:notes xmlns:a="http://schemas.openxmlformats.org/drawingml/2006/main" xmlns:r="http://schemas.openxmlformats.org/officeDocument/2006/relationships" xmlns:p="http://schemas.openxmlformats.org/presentationml/2006/main">
+  <p:cSld>
+    <p:spTree>
+      <p:nvGrpSpPr>
+        <p:cNvPr id="1" name=""/>
+        <p:cNvGrpSpPr/>
+        <p:nvPr/>
+      </p:nvGrpSpPr>
+      <p:grpSpPr>
+        <a:xfrm>
+          <a:off x="0" y="0"/>
+          <a:ext cx="0" cy="0"/>
+          <a:chOff x="0" y="0"/>
+          <a:chExt cx="0" cy="0"/>
+        </a:xfrm>
+      </p:grpSpPr>
+      <p:sp>
+        <p:nvSpPr>
+          <p:cNvPr id="2" name="幻灯片图像占位符 1"/>
+          <p:cNvSpPr>
+            <a:spLocks noGrp="1" noRot="1" noChangeAspect="1"/>
+          </p:cNvSpPr>
+          <p:nvPr>
+            <p:ph type="sldImg"/>
+          </p:nvPr>
+        </p:nvSpPr>
+        <p:spPr/>
+      </p:sp>
+      <p:sp>
+        <p:nvSpPr>
+          <p:cNvPr id="3" name="备注占位符 2"/>
+          <p:cNvSpPr>
+            <a:spLocks noGrp="1"/>
+          </p:cNvSpPr>
+          <p:nvPr>
+            <p:ph type="body" idx="1"/>
+          </p:nvPr>
+        </p:nvSpPr>
+        <p:spPr/>
+        <p:txBody>
+          <a:bodyPr/>
+          <a:lstStyle/>
+          <a:p>
+            <a:endParaRPr kumimoji="1" lang="zh-CN" altLang="en-US" dirty="0"/>
+          </a:p>
+        </p:txBody>
+      </p:sp>
+      <p:sp>
+        <p:nvSpPr>
+          <p:cNvPr id="4" name="幻灯片编号占位符 3"/>
+          <p:cNvSpPr>
+            <a:spLocks noGrp="1"/>
+          </p:cNvSpPr>
+          <p:nvPr>
+            <p:ph type="sldNum" sz="quarter" idx="10"/>
+          </p:nvPr>
+        </p:nvSpPr>
+        <p:spPr/>
+        <p:txBody>
+          <a:bodyPr/>
+          <a:lstStyle/>
+          <a:p>
+            <a:fld id="{EEC43D9F-348C-4EFA-BA8C-BCBE316224D1}" type="slidenum">
+              <a:rPr lang="zh-CN" altLang="en-US" smtClean="0"/>
+              <a:t>13</a:t>
+            </a:fld>
+            <a:endParaRPr lang="zh-CN" altLang="en-US"/>
+          </a:p>
+        </p:txBody>
+      </p:sp>
+    </p:spTree>
+    <p:extLst>
+      <p:ext uri="{BB962C8B-B14F-4D97-AF65-F5344CB8AC3E}">
+        <p14:creationId xmlns:p14="http://schemas.microsoft.com/office/powerpoint/2010/main" val="988701718"/>
+      </p:ext>
+    </p:extLst>
+  </p:cSld>
+  <p:clrMapOvr>
+    <a:masterClrMapping/>
+  </p:clrMapOvr>
+</p:notes>
+</file>
+
+<file path=ppt/notesSlides/notesSlide14.xml><?xml version="1.0" encoding="utf-8"?>
+<p:notes xmlns:a="http://schemas.openxmlformats.org/drawingml/2006/main" xmlns:r="http://schemas.openxmlformats.org/officeDocument/2006/relationships" xmlns:p="http://schemas.openxmlformats.org/presentationml/2006/main">
+  <p:cSld>
+    <p:spTree>
+      <p:nvGrpSpPr>
+        <p:cNvPr id="1" name=""/>
+        <p:cNvGrpSpPr/>
+        <p:nvPr/>
+      </p:nvGrpSpPr>
+      <p:grpSpPr>
+        <a:xfrm>
+          <a:off x="0" y="0"/>
+          <a:ext cx="0" cy="0"/>
+          <a:chOff x="0" y="0"/>
+          <a:chExt cx="0" cy="0"/>
+        </a:xfrm>
+      </p:grpSpPr>
+      <p:sp>
+        <p:nvSpPr>
+          <p:cNvPr id="2" name="幻灯片图像占位符 1"/>
+          <p:cNvSpPr>
+            <a:spLocks noGrp="1" noRot="1" noChangeAspect="1"/>
+          </p:cNvSpPr>
+          <p:nvPr>
+            <p:ph type="sldImg"/>
+          </p:nvPr>
+        </p:nvSpPr>
         <p:spPr>
           <a:xfrm>
             <a:off x="382588" y="685800"/>
@@ -871,7 +1211,7 @@
             <a:fld id="{EEC43D9F-348C-4EFA-BA8C-BCBE316224D1}" type="slidenum">
               <a:rPr lang="zh-CN" altLang="en-US" smtClean="0"/>
               <a:pPr/>
-              <a:t>10</a:t>
+              <a:t>14</a:t>
             </a:fld>
             <a:endParaRPr lang="zh-CN" altLang="en-US"/>
           </a:p>
@@ -1384,7 +1724,7 @@
     </p:spTree>
     <p:extLst>
       <p:ext uri="{BB962C8B-B14F-4D97-AF65-F5344CB8AC3E}">
-        <p14:creationId xmlns:p14="http://schemas.microsoft.com/office/powerpoint/2010/main" val="1479337113"/>
+        <p14:creationId xmlns:p14="http://schemas.microsoft.com/office/powerpoint/2010/main" val="2087880737"/>
       </p:ext>
     </p:extLst>
   </p:cSld>
@@ -1468,7 +1808,7 @@
     </p:spTree>
     <p:extLst>
       <p:ext uri="{BB962C8B-B14F-4D97-AF65-F5344CB8AC3E}">
-        <p14:creationId xmlns:p14="http://schemas.microsoft.com/office/powerpoint/2010/main" val="1369962118"/>
+        <p14:creationId xmlns:p14="http://schemas.microsoft.com/office/powerpoint/2010/main" val="1479337113"/>
       </p:ext>
     </p:extLst>
   </p:cSld>
@@ -1552,7 +1892,7 @@
     </p:spTree>
     <p:extLst>
       <p:ext uri="{BB962C8B-B14F-4D97-AF65-F5344CB8AC3E}">
-        <p14:creationId xmlns:p14="http://schemas.microsoft.com/office/powerpoint/2010/main" val="988701718"/>
+        <p14:creationId xmlns:p14="http://schemas.microsoft.com/office/powerpoint/2010/main" val="1369962118"/>
       </p:ext>
     </p:extLst>
   </p:cSld>
@@ -7722,200 +8062,6 @@
           </a:p>
         </p:txBody>
       </p:sp>
-      <p:grpSp>
-        <p:nvGrpSpPr>
-          <p:cNvPr id="15" name="组 14"/>
-          <p:cNvGrpSpPr/>
-          <p:nvPr/>
-        </p:nvGrpSpPr>
-        <p:grpSpPr>
-          <a:xfrm>
-            <a:off x="0" y="3431319"/>
-            <a:ext cx="11522075" cy="1299430"/>
-            <a:chOff x="0" y="3241675"/>
-            <a:chExt cx="11522075" cy="1299430"/>
-          </a:xfrm>
-        </p:grpSpPr>
-        <p:pic>
-          <p:nvPicPr>
-            <p:cNvPr id="16" name="图片 15" descr="Comp_8078783329.jpg"/>
-            <p:cNvPicPr>
-              <a:picLocks noChangeAspect="1"/>
-            </p:cNvPicPr>
-            <p:nvPr/>
-          </p:nvPicPr>
-          <p:blipFill rotWithShape="1">
-            <a:blip r:embed="rId3">
-              <a:extLst>
-                <a:ext uri="{28A0092B-C50C-407E-A947-70E740481C1C}">
-                  <a14:useLocalDpi xmlns:a14="http://schemas.microsoft.com/office/drawing/2010/main" val="0"/>
-                </a:ext>
-              </a:extLst>
-            </a:blip>
-            <a:srcRect l="13363" t="17789" r="9323" b="25071"/>
-            <a:stretch/>
-          </p:blipFill>
-          <p:spPr>
-            <a:xfrm>
-              <a:off x="0" y="3244850"/>
-              <a:ext cx="1944000" cy="1293081"/>
-            </a:xfrm>
-            <a:prstGeom prst="rect">
-              <a:avLst/>
-            </a:prstGeom>
-          </p:spPr>
-        </p:pic>
-        <p:pic>
-          <p:nvPicPr>
-            <p:cNvPr id="19" name="图片 18" descr="Comp_8063217336.jpg"/>
-            <p:cNvPicPr>
-              <a:picLocks noChangeAspect="1"/>
-            </p:cNvPicPr>
-            <p:nvPr/>
-          </p:nvPicPr>
-          <p:blipFill>
-            <a:blip r:embed="rId4" cstate="print">
-              <a:extLst>
-                <a:ext uri="{28A0092B-C50C-407E-A947-70E740481C1C}">
-                  <a14:useLocalDpi xmlns:a14="http://schemas.microsoft.com/office/drawing/2010/main" val="0"/>
-                </a:ext>
-              </a:extLst>
-            </a:blip>
-            <a:stretch>
-              <a:fillRect/>
-            </a:stretch>
-          </p:blipFill>
-          <p:spPr>
-            <a:xfrm>
-              <a:off x="1923309" y="3244023"/>
-              <a:ext cx="1944000" cy="1294734"/>
-            </a:xfrm>
-            <a:prstGeom prst="rect">
-              <a:avLst/>
-            </a:prstGeom>
-          </p:spPr>
-        </p:pic>
-        <p:pic>
-          <p:nvPicPr>
-            <p:cNvPr id="20" name="图片 19" descr="Comp_8072899986.jpg"/>
-            <p:cNvPicPr>
-              <a:picLocks noChangeAspect="1"/>
-            </p:cNvPicPr>
-            <p:nvPr/>
-          </p:nvPicPr>
-          <p:blipFill rotWithShape="1">
-            <a:blip r:embed="rId5" cstate="print">
-              <a:extLst>
-                <a:ext uri="{28A0092B-C50C-407E-A947-70E740481C1C}">
-                  <a14:useLocalDpi xmlns:a14="http://schemas.microsoft.com/office/drawing/2010/main" val="0"/>
-                </a:ext>
-              </a:extLst>
-            </a:blip>
-            <a:srcRect l="5716"/>
-            <a:stretch/>
-          </p:blipFill>
-          <p:spPr>
-            <a:xfrm>
-              <a:off x="3846618" y="3243390"/>
-              <a:ext cx="1945747" cy="1296000"/>
-            </a:xfrm>
-            <a:prstGeom prst="rect">
-              <a:avLst/>
-            </a:prstGeom>
-          </p:spPr>
-        </p:pic>
-        <p:pic>
-          <p:nvPicPr>
-            <p:cNvPr id="21" name="图片 20" descr="Comp_8049127417.jpg"/>
-            <p:cNvPicPr>
-              <a:picLocks noChangeAspect="1"/>
-            </p:cNvPicPr>
-            <p:nvPr/>
-          </p:nvPicPr>
-          <p:blipFill rotWithShape="1">
-            <a:blip r:embed="rId6" cstate="print">
-              <a:extLst>
-                <a:ext uri="{28A0092B-C50C-407E-A947-70E740481C1C}">
-                  <a14:useLocalDpi xmlns:a14="http://schemas.microsoft.com/office/drawing/2010/main" val="0"/>
-                </a:ext>
-              </a:extLst>
-            </a:blip>
-            <a:srcRect l="137" t="-72" r="-253" b="28019"/>
-            <a:stretch/>
-          </p:blipFill>
-          <p:spPr>
-            <a:xfrm>
-              <a:off x="5771674" y="3241675"/>
-              <a:ext cx="1946276" cy="1299430"/>
-            </a:xfrm>
-            <a:prstGeom prst="rect">
-              <a:avLst/>
-            </a:prstGeom>
-            <a:noFill/>
-            <a:ln>
-              <a:noFill/>
-            </a:ln>
-          </p:spPr>
-        </p:pic>
-        <p:pic>
-          <p:nvPicPr>
-            <p:cNvPr id="22" name="图片 21" descr="Comp_8051917180.jpg"/>
-            <p:cNvPicPr>
-              <a:picLocks noChangeAspect="1"/>
-            </p:cNvPicPr>
-            <p:nvPr/>
-          </p:nvPicPr>
-          <p:blipFill rotWithShape="1">
-            <a:blip r:embed="rId7">
-              <a:extLst>
-                <a:ext uri="{28A0092B-C50C-407E-A947-70E740481C1C}">
-                  <a14:useLocalDpi xmlns:a14="http://schemas.microsoft.com/office/drawing/2010/main" val="0"/>
-                </a:ext>
-              </a:extLst>
-            </a:blip>
-            <a:srcRect l="14265" t="11556" r="24661" b="26344"/>
-            <a:stretch/>
-          </p:blipFill>
-          <p:spPr>
-            <a:xfrm>
-              <a:off x="7697259" y="3243364"/>
-              <a:ext cx="1913858" cy="1296052"/>
-            </a:xfrm>
-            <a:prstGeom prst="rect">
-              <a:avLst/>
-            </a:prstGeom>
-          </p:spPr>
-        </p:pic>
-        <p:pic>
-          <p:nvPicPr>
-            <p:cNvPr id="23" name="图片 22" descr="Comp_8076345794.jpg"/>
-            <p:cNvPicPr>
-              <a:picLocks noChangeAspect="1"/>
-            </p:cNvPicPr>
-            <p:nvPr/>
-          </p:nvPicPr>
-          <p:blipFill rotWithShape="1">
-            <a:blip r:embed="rId8" cstate="print">
-              <a:extLst>
-                <a:ext uri="{28A0092B-C50C-407E-A947-70E740481C1C}">
-                  <a14:useLocalDpi xmlns:a14="http://schemas.microsoft.com/office/drawing/2010/main" val="0"/>
-                </a:ext>
-              </a:extLst>
-            </a:blip>
-            <a:srcRect l="1330" r="1503"/>
-            <a:stretch/>
-          </p:blipFill>
-          <p:spPr>
-            <a:xfrm>
-              <a:off x="9590428" y="3243318"/>
-              <a:ext cx="1931647" cy="1296144"/>
-            </a:xfrm>
-            <a:prstGeom prst="rect">
-              <a:avLst/>
-            </a:prstGeom>
-          </p:spPr>
-        </p:pic>
-      </p:grpSp>
       <p:sp>
         <p:nvSpPr>
           <p:cNvPr id="18" name="文本框 17"/>
@@ -8011,26 +8157,43 @@
       </p:sp>
       <p:pic>
         <p:nvPicPr>
-          <p:cNvPr id="24" name="图片 23"/>
+          <p:cNvPr id="25" name="Picture 2" descr="http://www.eastime.com.cn/images/index_06.jpg"/>
           <p:cNvPicPr>
-            <a:picLocks noChangeAspect="1"/>
+            <a:picLocks noChangeAspect="1" noChangeArrowheads="1"/>
           </p:cNvPicPr>
           <p:nvPr/>
         </p:nvPicPr>
         <p:blipFill>
-          <a:blip r:embed="rId9"/>
+          <a:blip r:embed="rId3">
+            <a:extLst>
+              <a:ext uri="{28A0092B-C50C-407E-A947-70E740481C1C}">
+                <a14:useLocalDpi xmlns:a14="http://schemas.microsoft.com/office/drawing/2010/main" val="0"/>
+              </a:ext>
+            </a:extLst>
+          </a:blip>
+          <a:srcRect/>
           <a:stretch>
             <a:fillRect/>
           </a:stretch>
         </p:blipFill>
-        <p:spPr>
+        <p:spPr bwMode="auto">
           <a:xfrm>
-            <a:off x="183728" y="186290"/>
-            <a:ext cx="1904901" cy="726283"/>
+            <a:off x="176212" y="123935"/>
+            <a:ext cx="919491" cy="297678"/>
           </a:xfrm>
           <a:prstGeom prst="rect">
             <a:avLst/>
           </a:prstGeom>
+          <a:noFill/>
+          <a:extLst>
+            <a:ext uri="{909E8E84-426E-40DD-AFC4-6F175D3DCCD1}">
+              <a14:hiddenFill xmlns:a14="http://schemas.microsoft.com/office/drawing/2010/main">
+                <a:solidFill>
+                  <a:srgbClr val="FFFFFF"/>
+                </a:solidFill>
+              </a14:hiddenFill>
+            </a:ext>
+          </a:extLst>
         </p:spPr>
       </p:pic>
     </p:spTree>
@@ -8070,6 +8233,336 @@
           <a:chExt cx="0" cy="0"/>
         </a:xfrm>
       </p:grpSpPr>
+      <p:sp>
+        <p:nvSpPr>
+          <p:cNvPr id="13" name="标题 1"/>
+          <p:cNvSpPr>
+            <a:spLocks noGrp="1"/>
+          </p:cNvSpPr>
+          <p:nvPr>
+            <p:ph type="title"/>
+          </p:nvPr>
+        </p:nvSpPr>
+        <p:spPr/>
+        <p:txBody>
+          <a:bodyPr/>
+          <a:lstStyle/>
+          <a:p>
+            <a:r>
+              <a:rPr lang="zh-CN" altLang="en-US" dirty="0" smtClean="0">
+                <a:solidFill>
+                  <a:srgbClr val="18A2EF"/>
+                </a:solidFill>
+                <a:latin typeface="+mj-ea"/>
+                <a:ea typeface="+mj-ea"/>
+              </a:rPr>
+              <a:t>程序结构</a:t>
+            </a:r>
+            <a:endParaRPr lang="zh-CN" altLang="en-US" dirty="0">
+              <a:solidFill>
+                <a:srgbClr val="18A2EF"/>
+              </a:solidFill>
+              <a:latin typeface="+mj-ea"/>
+              <a:ea typeface="+mj-ea"/>
+            </a:endParaRPr>
+          </a:p>
+        </p:txBody>
+      </p:sp>
+      <p:sp>
+        <p:nvSpPr>
+          <p:cNvPr id="5" name="矩形 4"/>
+          <p:cNvSpPr/>
+          <p:nvPr/>
+        </p:nvSpPr>
+        <p:spPr>
+          <a:xfrm>
+            <a:off x="412012" y="1081435"/>
+            <a:ext cx="1964650" cy="3477875"/>
+          </a:xfrm>
+          <a:prstGeom prst="rect">
+            <a:avLst/>
+          </a:prstGeom>
+        </p:spPr>
+        <p:txBody>
+          <a:bodyPr wrap="square">
+            <a:spAutoFit/>
+          </a:bodyPr>
+          <a:lstStyle/>
+          <a:p>
+            <a:pPr algn="just"/>
+            <a:r>
+              <a:rPr lang="zh-CN" altLang="en-US" sz="2000" b="1" kern="100" dirty="0" smtClean="0">
+                <a:latin typeface="Times New Roman" panose="02020603050405020304" pitchFamily="18" charset="0"/>
+                <a:cs typeface="Times New Roman" panose="02020603050405020304" pitchFamily="18" charset="0"/>
+              </a:rPr>
+              <a:t>说明</a:t>
+            </a:r>
+            <a:r>
+              <a:rPr lang="zh-CN" altLang="zh-CN" sz="2000" b="1" kern="100" dirty="0" smtClean="0">
+                <a:latin typeface="Times New Roman" panose="02020603050405020304" pitchFamily="18" charset="0"/>
+                <a:cs typeface="Times New Roman" panose="02020603050405020304" pitchFamily="18" charset="0"/>
+              </a:rPr>
+              <a:t>：</a:t>
+            </a:r>
+            <a:endParaRPr lang="en-US" altLang="zh-CN" sz="2000" b="1" kern="100" dirty="0" smtClean="0">
+              <a:latin typeface="Times New Roman" panose="02020603050405020304" pitchFamily="18" charset="0"/>
+              <a:cs typeface="Times New Roman" panose="02020603050405020304" pitchFamily="18" charset="0"/>
+            </a:endParaRPr>
+          </a:p>
+          <a:p>
+            <a:pPr algn="just"/>
+            <a:endParaRPr lang="en-US" altLang="zh-CN" sz="2000" dirty="0"/>
+          </a:p>
+          <a:p>
+            <a:r>
+              <a:rPr lang="en-US" altLang="zh-CN" sz="2000" dirty="0" smtClean="0"/>
+              <a:t>1</a:t>
+            </a:r>
+            <a:r>
+              <a:rPr lang="zh-CN" altLang="en-US" sz="2000" dirty="0" smtClean="0"/>
+              <a:t>、</a:t>
+            </a:r>
+            <a:r>
+              <a:rPr lang="en-US" altLang="zh-CN" sz="2000" dirty="0" err="1" smtClean="0"/>
+              <a:t>index.html</a:t>
+            </a:r>
+            <a:endParaRPr lang="en-US" altLang="zh-CN" sz="2000" dirty="0" smtClean="0"/>
+          </a:p>
+          <a:p>
+            <a:endParaRPr lang="en-US" altLang="zh-CN" sz="2000" dirty="0"/>
+          </a:p>
+          <a:p>
+            <a:r>
+              <a:rPr lang="en-US" altLang="zh-CN" sz="2000" dirty="0" smtClean="0"/>
+              <a:t>2</a:t>
+            </a:r>
+            <a:r>
+              <a:rPr lang="zh-CN" altLang="en-US" sz="2000" dirty="0" smtClean="0"/>
+              <a:t>、</a:t>
+            </a:r>
+            <a:r>
+              <a:rPr lang="en-US" altLang="zh-CN" sz="2000" dirty="0" err="1" smtClean="0"/>
+              <a:t>app.js</a:t>
+            </a:r>
+            <a:r>
+              <a:rPr lang="zh-CN" altLang="en-US" sz="2000" dirty="0" smtClean="0"/>
+              <a:t> 路由</a:t>
+            </a:r>
+            <a:endParaRPr lang="en-US" altLang="zh-CN" sz="2000" dirty="0" smtClean="0"/>
+          </a:p>
+          <a:p>
+            <a:endParaRPr lang="en-US" altLang="zh-CN" sz="2000" dirty="0"/>
+          </a:p>
+          <a:p>
+            <a:r>
+              <a:rPr lang="en-US" altLang="zh-CN" sz="2000" dirty="0" smtClean="0"/>
+              <a:t>3</a:t>
+            </a:r>
+            <a:r>
+              <a:rPr lang="zh-CN" altLang="en-US" sz="2000" dirty="0" smtClean="0"/>
+              <a:t>、</a:t>
+            </a:r>
+            <a:r>
+              <a:rPr lang="en-US" altLang="zh-CN" sz="2000" dirty="0" err="1" smtClean="0"/>
+              <a:t>controller.js</a:t>
+            </a:r>
+            <a:endParaRPr lang="en-US" altLang="zh-CN" sz="2000" dirty="0" smtClean="0"/>
+          </a:p>
+          <a:p>
+            <a:endParaRPr lang="en-US" altLang="zh-CN" sz="2000" dirty="0"/>
+          </a:p>
+          <a:p>
+            <a:r>
+              <a:rPr lang="en-US" altLang="zh-CN" sz="2000" dirty="0" smtClean="0"/>
+              <a:t>4</a:t>
+            </a:r>
+            <a:r>
+              <a:rPr lang="zh-CN" altLang="en-US" sz="2000" dirty="0" smtClean="0"/>
+              <a:t>、</a:t>
+            </a:r>
+            <a:r>
+              <a:rPr lang="en-US" altLang="zh-CN" sz="2000" dirty="0" err="1" smtClean="0"/>
+              <a:t>services.js</a:t>
+            </a:r>
+            <a:endParaRPr lang="en-US" altLang="zh-CN" sz="2000" dirty="0" smtClean="0"/>
+          </a:p>
+          <a:p>
+            <a:endParaRPr lang="en-US" altLang="zh-CN" sz="2000" dirty="0"/>
+          </a:p>
+          <a:p>
+            <a:pPr algn="just"/>
+            <a:endParaRPr lang="zh-CN" altLang="en-US" sz="2000" dirty="0"/>
+          </a:p>
+        </p:txBody>
+      </p:sp>
+    </p:spTree>
+    <p:extLst>
+      <p:ext uri="{BB962C8B-B14F-4D97-AF65-F5344CB8AC3E}">
+        <p14:creationId xmlns:p14="http://schemas.microsoft.com/office/powerpoint/2010/main" val="461656083"/>
+      </p:ext>
+    </p:extLst>
+  </p:cSld>
+  <p:clrMapOvr>
+    <a:masterClrMapping/>
+  </p:clrMapOvr>
+  <p:timing>
+    <p:tnLst>
+      <p:par>
+        <p:cTn id="1" dur="indefinite" restart="never" nodeType="tmRoot"/>
+      </p:par>
+    </p:tnLst>
+  </p:timing>
+</p:sld>
+</file>
+
+<file path=ppt/slides/slide11.xml><?xml version="1.0" encoding="utf-8"?>
+<p:sld xmlns:a="http://schemas.openxmlformats.org/drawingml/2006/main" xmlns:r="http://schemas.openxmlformats.org/officeDocument/2006/relationships" xmlns:p="http://schemas.openxmlformats.org/presentationml/2006/main">
+  <p:cSld>
+    <p:spTree>
+      <p:nvGrpSpPr>
+        <p:cNvPr id="1" name=""/>
+        <p:cNvGrpSpPr/>
+        <p:nvPr/>
+      </p:nvGrpSpPr>
+      <p:grpSpPr>
+        <a:xfrm>
+          <a:off x="0" y="0"/>
+          <a:ext cx="0" cy="0"/>
+          <a:chOff x="0" y="0"/>
+          <a:chExt cx="0" cy="0"/>
+        </a:xfrm>
+      </p:grpSpPr>
+      <p:sp>
+        <p:nvSpPr>
+          <p:cNvPr id="13" name="标题 1"/>
+          <p:cNvSpPr>
+            <a:spLocks noGrp="1"/>
+          </p:cNvSpPr>
+          <p:nvPr>
+            <p:ph type="title"/>
+          </p:nvPr>
+        </p:nvSpPr>
+        <p:spPr/>
+        <p:txBody>
+          <a:bodyPr/>
+          <a:lstStyle/>
+          <a:p>
+            <a:r>
+              <a:rPr lang="zh-CN" altLang="en-US" dirty="0" smtClean="0">
+                <a:solidFill>
+                  <a:srgbClr val="18A2EF"/>
+                </a:solidFill>
+                <a:latin typeface="+mj-ea"/>
+                <a:ea typeface="+mj-ea"/>
+              </a:rPr>
+              <a:t>五</a:t>
+            </a:r>
+            <a:r>
+              <a:rPr lang="zh-CN" altLang="en-US" dirty="0">
+                <a:solidFill>
+                  <a:srgbClr val="18A2EF"/>
+                </a:solidFill>
+                <a:latin typeface="+mj-ea"/>
+                <a:ea typeface="+mj-ea"/>
+              </a:rPr>
+              <a:t>、</a:t>
+            </a:r>
+            <a:r>
+              <a:rPr lang="en-US" altLang="zh-CN" dirty="0" smtClean="0">
+                <a:solidFill>
+                  <a:srgbClr val="18A2EF"/>
+                </a:solidFill>
+                <a:latin typeface="+mj-ea"/>
+                <a:ea typeface="+mj-ea"/>
+              </a:rPr>
+              <a:t>Ionic</a:t>
+            </a:r>
+            <a:r>
+              <a:rPr lang="zh-CN" altLang="en-US" dirty="0">
+                <a:solidFill>
+                  <a:srgbClr val="18A2EF"/>
+                </a:solidFill>
+                <a:latin typeface="+mj-ea"/>
+                <a:ea typeface="+mj-ea"/>
+              </a:rPr>
+              <a:t> </a:t>
+            </a:r>
+            <a:r>
+              <a:rPr lang="en-US" altLang="zh-CN" dirty="0" smtClean="0">
+                <a:solidFill>
+                  <a:srgbClr val="18A2EF"/>
+                </a:solidFill>
+                <a:latin typeface="+mj-ea"/>
+                <a:ea typeface="+mj-ea"/>
+              </a:rPr>
+              <a:t>CSS</a:t>
+            </a:r>
+            <a:endParaRPr lang="zh-CN" altLang="en-US" dirty="0">
+              <a:solidFill>
+                <a:srgbClr val="18A2EF"/>
+              </a:solidFill>
+              <a:latin typeface="+mj-ea"/>
+              <a:ea typeface="+mj-ea"/>
+            </a:endParaRPr>
+          </a:p>
+        </p:txBody>
+      </p:sp>
+      <p:sp>
+        <p:nvSpPr>
+          <p:cNvPr id="5" name="矩形 4"/>
+          <p:cNvSpPr/>
+          <p:nvPr/>
+        </p:nvSpPr>
+        <p:spPr>
+          <a:xfrm>
+            <a:off x="412012" y="1081435"/>
+            <a:ext cx="5565050" cy="707886"/>
+          </a:xfrm>
+          <a:prstGeom prst="rect">
+            <a:avLst/>
+          </a:prstGeom>
+        </p:spPr>
+        <p:txBody>
+          <a:bodyPr wrap="square">
+            <a:spAutoFit/>
+          </a:bodyPr>
+          <a:lstStyle/>
+          <a:p>
+            <a:pPr algn="just"/>
+            <a:r>
+              <a:rPr lang="zh-CN" altLang="en-US" sz="2000" b="1" kern="100" dirty="0" smtClean="0">
+                <a:latin typeface="Times New Roman" panose="02020603050405020304" pitchFamily="18" charset="0"/>
+                <a:cs typeface="Times New Roman" panose="02020603050405020304" pitchFamily="18" charset="0"/>
+              </a:rPr>
+              <a:t>参考</a:t>
+            </a:r>
+            <a:r>
+              <a:rPr lang="zh-CN" altLang="zh-CN" sz="2000" b="1" kern="100" dirty="0" smtClean="0">
+                <a:latin typeface="Times New Roman" panose="02020603050405020304" pitchFamily="18" charset="0"/>
+                <a:cs typeface="Times New Roman" panose="02020603050405020304" pitchFamily="18" charset="0"/>
+              </a:rPr>
+              <a:t>：</a:t>
+            </a:r>
+            <a:endParaRPr lang="en-US" altLang="zh-CN" sz="2000" dirty="0"/>
+          </a:p>
+          <a:p>
+            <a:pPr algn="just"/>
+            <a:r>
+              <a:rPr lang="en-US" altLang="zh-CN" sz="2000" dirty="0"/>
+              <a:t>https://</a:t>
+            </a:r>
+            <a:r>
+              <a:rPr lang="en-US" altLang="zh-CN" sz="2000" dirty="0" err="1"/>
+              <a:t>ionicframework.com</a:t>
+            </a:r>
+            <a:r>
+              <a:rPr lang="en-US" altLang="zh-CN" sz="2000" dirty="0"/>
+              <a:t>/docs/v1/components/</a:t>
+            </a:r>
+            <a:endParaRPr lang="zh-CN" altLang="en-US" sz="2000" dirty="0"/>
+          </a:p>
+        </p:txBody>
+      </p:sp>
       <p:pic>
         <p:nvPicPr>
           <p:cNvPr id="2" name="图片 1"/>
@@ -8086,12 +8579,1225 @@
         </p:blipFill>
         <p:spPr>
           <a:xfrm>
-            <a:off x="4176861" y="2161555"/>
-            <a:ext cx="3528392" cy="1345273"/>
+            <a:off x="3633293" y="1789320"/>
+            <a:ext cx="6876897" cy="4694029"/>
           </a:xfrm>
           <a:prstGeom prst="rect">
             <a:avLst/>
           </a:prstGeom>
+        </p:spPr>
+      </p:pic>
+    </p:spTree>
+    <p:extLst>
+      <p:ext uri="{BB962C8B-B14F-4D97-AF65-F5344CB8AC3E}">
+        <p14:creationId xmlns:p14="http://schemas.microsoft.com/office/powerpoint/2010/main" val="1494996890"/>
+      </p:ext>
+    </p:extLst>
+  </p:cSld>
+  <p:clrMapOvr>
+    <a:masterClrMapping/>
+  </p:clrMapOvr>
+  <p:timing>
+    <p:tnLst>
+      <p:par>
+        <p:cTn id="1" dur="indefinite" restart="never" nodeType="tmRoot"/>
+      </p:par>
+    </p:tnLst>
+  </p:timing>
+</p:sld>
+</file>
+
+<file path=ppt/slides/slide12.xml><?xml version="1.0" encoding="utf-8"?>
+<p:sld xmlns:a="http://schemas.openxmlformats.org/drawingml/2006/main" xmlns:r="http://schemas.openxmlformats.org/officeDocument/2006/relationships" xmlns:p="http://schemas.openxmlformats.org/presentationml/2006/main">
+  <p:cSld>
+    <p:spTree>
+      <p:nvGrpSpPr>
+        <p:cNvPr id="1" name=""/>
+        <p:cNvGrpSpPr/>
+        <p:nvPr/>
+      </p:nvGrpSpPr>
+      <p:grpSpPr>
+        <a:xfrm>
+          <a:off x="0" y="0"/>
+          <a:ext cx="0" cy="0"/>
+          <a:chOff x="0" y="0"/>
+          <a:chExt cx="0" cy="0"/>
+        </a:xfrm>
+      </p:grpSpPr>
+      <p:sp>
+        <p:nvSpPr>
+          <p:cNvPr id="13" name="标题 1"/>
+          <p:cNvSpPr>
+            <a:spLocks noGrp="1"/>
+          </p:cNvSpPr>
+          <p:nvPr>
+            <p:ph type="title"/>
+          </p:nvPr>
+        </p:nvSpPr>
+        <p:spPr/>
+        <p:txBody>
+          <a:bodyPr/>
+          <a:lstStyle/>
+          <a:p>
+            <a:r>
+              <a:rPr lang="zh-CN" altLang="en-US" dirty="0" smtClean="0">
+                <a:solidFill>
+                  <a:srgbClr val="18A2EF"/>
+                </a:solidFill>
+                <a:latin typeface="+mj-ea"/>
+                <a:ea typeface="+mj-ea"/>
+              </a:rPr>
+              <a:t>六、</a:t>
+            </a:r>
+            <a:r>
+              <a:rPr lang="en-US" altLang="zh-CN" dirty="0" smtClean="0">
+                <a:solidFill>
+                  <a:srgbClr val="18A2EF"/>
+                </a:solidFill>
+                <a:latin typeface="+mj-ea"/>
+                <a:ea typeface="+mj-ea"/>
+              </a:rPr>
+              <a:t>Ionic</a:t>
+            </a:r>
+            <a:r>
+              <a:rPr lang="zh-CN" altLang="en-US" dirty="0" smtClean="0">
+                <a:solidFill>
+                  <a:srgbClr val="18A2EF"/>
+                </a:solidFill>
+                <a:latin typeface="+mj-ea"/>
+                <a:ea typeface="+mj-ea"/>
+              </a:rPr>
+              <a:t> </a:t>
+            </a:r>
+            <a:r>
+              <a:rPr lang="en-US" altLang="zh-CN" dirty="0">
+                <a:solidFill>
+                  <a:srgbClr val="18A2EF"/>
+                </a:solidFill>
+                <a:latin typeface="+mj-ea"/>
+                <a:ea typeface="+mj-ea"/>
+              </a:rPr>
+              <a:t>p</a:t>
+            </a:r>
+            <a:r>
+              <a:rPr lang="en-US" altLang="zh-CN" dirty="0" smtClean="0">
+                <a:solidFill>
+                  <a:srgbClr val="18A2EF"/>
+                </a:solidFill>
+                <a:latin typeface="+mj-ea"/>
+                <a:ea typeface="+mj-ea"/>
+              </a:rPr>
+              <a:t>lugins</a:t>
+            </a:r>
+            <a:endParaRPr lang="zh-CN" altLang="en-US" dirty="0">
+              <a:solidFill>
+                <a:srgbClr val="18A2EF"/>
+              </a:solidFill>
+              <a:latin typeface="+mj-ea"/>
+              <a:ea typeface="+mj-ea"/>
+            </a:endParaRPr>
+          </a:p>
+        </p:txBody>
+      </p:sp>
+      <p:sp>
+        <p:nvSpPr>
+          <p:cNvPr id="5" name="矩形 4"/>
+          <p:cNvSpPr/>
+          <p:nvPr/>
+        </p:nvSpPr>
+        <p:spPr>
+          <a:xfrm>
+            <a:off x="288429" y="1009427"/>
+            <a:ext cx="6141113" cy="1938992"/>
+          </a:xfrm>
+          <a:prstGeom prst="rect">
+            <a:avLst/>
+          </a:prstGeom>
+        </p:spPr>
+        <p:txBody>
+          <a:bodyPr wrap="square">
+            <a:spAutoFit/>
+          </a:bodyPr>
+          <a:lstStyle/>
+          <a:p>
+            <a:pPr algn="just"/>
+            <a:r>
+              <a:rPr lang="zh-CN" altLang="en-US" sz="2000" b="1" kern="100" dirty="0" smtClean="0">
+                <a:latin typeface="Times New Roman" panose="02020603050405020304" pitchFamily="18" charset="0"/>
+                <a:cs typeface="Times New Roman" panose="02020603050405020304" pitchFamily="18" charset="0"/>
+              </a:rPr>
+              <a:t>参考</a:t>
+            </a:r>
+            <a:r>
+              <a:rPr lang="zh-CN" altLang="zh-CN" sz="2000" b="1" kern="100" dirty="0" smtClean="0">
+                <a:latin typeface="Times New Roman" panose="02020603050405020304" pitchFamily="18" charset="0"/>
+                <a:cs typeface="Times New Roman" panose="02020603050405020304" pitchFamily="18" charset="0"/>
+              </a:rPr>
+              <a:t>：</a:t>
+            </a:r>
+            <a:endParaRPr lang="en-US" altLang="zh-CN" sz="2000" dirty="0"/>
+          </a:p>
+          <a:p>
+            <a:pPr algn="just"/>
+            <a:r>
+              <a:rPr lang="en-US" altLang="zh-CN" sz="2000" dirty="0" smtClean="0"/>
+              <a:t>1</a:t>
+            </a:r>
+            <a:r>
+              <a:rPr lang="zh-CN" altLang="en-US" sz="2000" dirty="0" smtClean="0"/>
+              <a:t>、</a:t>
+            </a:r>
+            <a:r>
+              <a:rPr lang="en-US" altLang="zh-CN" sz="2000" dirty="0">
+                <a:hlinkClick r:id="rId3"/>
+              </a:rPr>
+              <a:t>http://ngcordova.com/docs/plugins</a:t>
+            </a:r>
+            <a:r>
+              <a:rPr lang="en-US" altLang="zh-CN" sz="2000" dirty="0" smtClean="0">
+                <a:hlinkClick r:id="rId3"/>
+              </a:rPr>
+              <a:t>/</a:t>
+            </a:r>
+            <a:endParaRPr lang="en-US" altLang="zh-CN" sz="2000" dirty="0" smtClean="0"/>
+          </a:p>
+          <a:p>
+            <a:pPr algn="just"/>
+            <a:endParaRPr lang="en-US" altLang="zh-CN" sz="2000" dirty="0" smtClean="0"/>
+          </a:p>
+          <a:p>
+            <a:pPr algn="just"/>
+            <a:r>
+              <a:rPr lang="en-US" altLang="zh-CN" sz="2000" dirty="0" smtClean="0"/>
+              <a:t>2</a:t>
+            </a:r>
+            <a:r>
+              <a:rPr lang="zh-CN" altLang="en-US" sz="2000" dirty="0" smtClean="0"/>
+              <a:t>、</a:t>
+            </a:r>
+            <a:r>
+              <a:rPr lang="en-US" altLang="zh-CN" sz="2000" dirty="0">
+                <a:hlinkClick r:id="rId4"/>
+              </a:rPr>
+              <a:t>http://cordova.apache.org/plugins</a:t>
+            </a:r>
+            <a:r>
+              <a:rPr lang="en-US" altLang="zh-CN" sz="2000" dirty="0" smtClean="0">
+                <a:hlinkClick r:id="rId4"/>
+              </a:rPr>
+              <a:t>/</a:t>
+            </a:r>
+            <a:endParaRPr lang="en-US" altLang="zh-CN" sz="2000" dirty="0" smtClean="0"/>
+          </a:p>
+          <a:p>
+            <a:pPr algn="just"/>
+            <a:endParaRPr lang="en-US" altLang="zh-CN" sz="2000" dirty="0" smtClean="0"/>
+          </a:p>
+          <a:p>
+            <a:pPr algn="just"/>
+            <a:endParaRPr lang="zh-CN" altLang="en-US" sz="2000" dirty="0"/>
+          </a:p>
+        </p:txBody>
+      </p:sp>
+      <p:pic>
+        <p:nvPicPr>
+          <p:cNvPr id="3" name="图片 2"/>
+          <p:cNvPicPr>
+            <a:picLocks noChangeAspect="1"/>
+          </p:cNvPicPr>
+          <p:nvPr/>
+        </p:nvPicPr>
+        <p:blipFill>
+          <a:blip r:embed="rId5"/>
+          <a:stretch>
+            <a:fillRect/>
+          </a:stretch>
+        </p:blipFill>
+        <p:spPr>
+          <a:xfrm>
+            <a:off x="551133" y="3193073"/>
+            <a:ext cx="5615704" cy="2782389"/>
+          </a:xfrm>
+          <a:prstGeom prst="rect">
+            <a:avLst/>
+          </a:prstGeom>
+        </p:spPr>
+      </p:pic>
+      <p:pic>
+        <p:nvPicPr>
+          <p:cNvPr id="4" name="图片 3"/>
+          <p:cNvPicPr>
+            <a:picLocks noChangeAspect="1"/>
+          </p:cNvPicPr>
+          <p:nvPr/>
+        </p:nvPicPr>
+        <p:blipFill>
+          <a:blip r:embed="rId6"/>
+          <a:stretch>
+            <a:fillRect/>
+          </a:stretch>
+        </p:blipFill>
+        <p:spPr>
+          <a:xfrm>
+            <a:off x="6789582" y="394089"/>
+            <a:ext cx="4513791" cy="3169667"/>
+          </a:xfrm>
+          <a:prstGeom prst="rect">
+            <a:avLst/>
+          </a:prstGeom>
+        </p:spPr>
+      </p:pic>
+    </p:spTree>
+    <p:extLst>
+      <p:ext uri="{BB962C8B-B14F-4D97-AF65-F5344CB8AC3E}">
+        <p14:creationId xmlns:p14="http://schemas.microsoft.com/office/powerpoint/2010/main" val="1924844396"/>
+      </p:ext>
+    </p:extLst>
+  </p:cSld>
+  <p:clrMapOvr>
+    <a:masterClrMapping/>
+  </p:clrMapOvr>
+  <p:timing>
+    <p:tnLst>
+      <p:par>
+        <p:cTn id="1" dur="indefinite" restart="never" nodeType="tmRoot"/>
+      </p:par>
+    </p:tnLst>
+  </p:timing>
+</p:sld>
+</file>
+
+<file path=ppt/slides/slide13.xml><?xml version="1.0" encoding="utf-8"?>
+<p:sld xmlns:a="http://schemas.openxmlformats.org/drawingml/2006/main" xmlns:r="http://schemas.openxmlformats.org/officeDocument/2006/relationships" xmlns:p="http://schemas.openxmlformats.org/presentationml/2006/main">
+  <p:cSld>
+    <p:spTree>
+      <p:nvGrpSpPr>
+        <p:cNvPr id="1" name=""/>
+        <p:cNvGrpSpPr/>
+        <p:nvPr/>
+      </p:nvGrpSpPr>
+      <p:grpSpPr>
+        <a:xfrm>
+          <a:off x="0" y="0"/>
+          <a:ext cx="0" cy="0"/>
+          <a:chOff x="0" y="0"/>
+          <a:chExt cx="0" cy="0"/>
+        </a:xfrm>
+      </p:grpSpPr>
+      <p:sp>
+        <p:nvSpPr>
+          <p:cNvPr id="13" name="标题 1"/>
+          <p:cNvSpPr>
+            <a:spLocks noGrp="1"/>
+          </p:cNvSpPr>
+          <p:nvPr>
+            <p:ph type="title"/>
+          </p:nvPr>
+        </p:nvSpPr>
+        <p:spPr>
+          <a:xfrm>
+            <a:off x="432445" y="649387"/>
+            <a:ext cx="9937790" cy="513899"/>
+          </a:xfrm>
+        </p:spPr>
+        <p:txBody>
+          <a:bodyPr>
+            <a:normAutofit fontScale="90000"/>
+          </a:bodyPr>
+          <a:lstStyle/>
+          <a:p>
+            <a:r>
+              <a:rPr lang="zh-CN" altLang="en-US" dirty="0" smtClean="0">
+                <a:solidFill>
+                  <a:srgbClr val="18A2EF"/>
+                </a:solidFill>
+              </a:rPr>
+              <a:t>遗留</a:t>
+            </a:r>
+            <a:endParaRPr lang="zh-CN" altLang="en-US" dirty="0">
+              <a:solidFill>
+                <a:srgbClr val="18A2EF"/>
+              </a:solidFill>
+            </a:endParaRPr>
+          </a:p>
+        </p:txBody>
+      </p:sp>
+      <p:graphicFrame>
+        <p:nvGraphicFramePr>
+          <p:cNvPr id="2" name="表格 1"/>
+          <p:cNvGraphicFramePr>
+            <a:graphicFrameLocks noGrp="1"/>
+          </p:cNvGraphicFramePr>
+          <p:nvPr>
+            <p:extLst>
+              <p:ext uri="{D42A27DB-BD31-4B8C-83A1-F6EECF244321}">
+                <p14:modId xmlns:p14="http://schemas.microsoft.com/office/powerpoint/2010/main" val="1792491547"/>
+              </p:ext>
+            </p:extLst>
+          </p:nvPr>
+        </p:nvGraphicFramePr>
+        <p:xfrm>
+          <a:off x="648469" y="2449587"/>
+          <a:ext cx="10513168" cy="1598876"/>
+        </p:xfrm>
+        <a:graphic>
+          <a:graphicData uri="http://schemas.openxmlformats.org/drawingml/2006/table">
+            <a:tbl>
+              <a:tblPr/>
+              <a:tblGrid>
+                <a:gridCol w="2474290"/>
+                <a:gridCol w="4763779"/>
+                <a:gridCol w="3275099"/>
+              </a:tblGrid>
+              <a:tr h="249100">
+                <a:tc>
+                  <a:txBody>
+                    <a:bodyPr/>
+                    <a:lstStyle/>
+                    <a:p>
+                      <a:r>
+                        <a:rPr lang="zh-CN" altLang="en-US" sz="1700" b="1" dirty="0" smtClean="0">
+                          <a:effectLst/>
+                        </a:rPr>
+                        <a:t>问题</a:t>
+                      </a:r>
+                      <a:endParaRPr lang="en-US" sz="1700" dirty="0">
+                        <a:effectLst/>
+                      </a:endParaRPr>
+                    </a:p>
+                  </a:txBody>
+                  <a:tcPr marL="73818" marR="73818" marT="27682" marB="27682">
+                    <a:lnL w="9525" cap="flat" cmpd="sng" algn="ctr">
+                      <a:solidFill>
+                        <a:srgbClr val="666666"/>
+                      </a:solidFill>
+                      <a:prstDash val="solid"/>
+                      <a:round/>
+                      <a:headEnd type="none" w="med" len="med"/>
+                      <a:tailEnd type="none" w="med" len="med"/>
+                    </a:lnL>
+                    <a:lnR w="9525" cap="flat" cmpd="sng" algn="ctr">
+                      <a:solidFill>
+                        <a:srgbClr val="666666"/>
+                      </a:solidFill>
+                      <a:prstDash val="solid"/>
+                      <a:round/>
+                      <a:headEnd type="none" w="med" len="med"/>
+                      <a:tailEnd type="none" w="med" len="med"/>
+                    </a:lnR>
+                    <a:lnT w="9525" cap="flat" cmpd="sng" algn="ctr">
+                      <a:solidFill>
+                        <a:srgbClr val="666666"/>
+                      </a:solidFill>
+                      <a:prstDash val="solid"/>
+                      <a:round/>
+                      <a:headEnd type="none" w="med" len="med"/>
+                      <a:tailEnd type="none" w="med" len="med"/>
+                    </a:lnT>
+                    <a:lnB w="9525" cap="flat" cmpd="sng" algn="ctr">
+                      <a:solidFill>
+                        <a:srgbClr val="666666"/>
+                      </a:solidFill>
+                      <a:prstDash val="solid"/>
+                      <a:round/>
+                      <a:headEnd type="none" w="med" len="med"/>
+                      <a:tailEnd type="none" w="med" len="med"/>
+                    </a:lnB>
+                  </a:tcPr>
+                </a:tc>
+                <a:tc>
+                  <a:txBody>
+                    <a:bodyPr/>
+                    <a:lstStyle/>
+                    <a:p>
+                      <a:r>
+                        <a:rPr lang="zh-CN" altLang="en-US" sz="1700" b="1" dirty="0" smtClean="0">
+                          <a:effectLst/>
+                        </a:rPr>
+                        <a:t>描述</a:t>
+                      </a:r>
+                      <a:endParaRPr lang="en-US" sz="1700" dirty="0">
+                        <a:effectLst/>
+                      </a:endParaRPr>
+                    </a:p>
+                  </a:txBody>
+                  <a:tcPr marL="73818" marR="73818" marT="27682" marB="27682">
+                    <a:lnL w="9525" cap="flat" cmpd="sng" algn="ctr">
+                      <a:solidFill>
+                        <a:srgbClr val="666666"/>
+                      </a:solidFill>
+                      <a:prstDash val="solid"/>
+                      <a:round/>
+                      <a:headEnd type="none" w="med" len="med"/>
+                      <a:tailEnd type="none" w="med" len="med"/>
+                    </a:lnL>
+                    <a:lnR w="9525" cap="flat" cmpd="sng" algn="ctr">
+                      <a:solidFill>
+                        <a:srgbClr val="666666"/>
+                      </a:solidFill>
+                      <a:prstDash val="solid"/>
+                      <a:round/>
+                      <a:headEnd type="none" w="med" len="med"/>
+                      <a:tailEnd type="none" w="med" len="med"/>
+                    </a:lnR>
+                    <a:lnT w="9525" cap="flat" cmpd="sng" algn="ctr">
+                      <a:solidFill>
+                        <a:srgbClr val="666666"/>
+                      </a:solidFill>
+                      <a:prstDash val="solid"/>
+                      <a:round/>
+                      <a:headEnd type="none" w="med" len="med"/>
+                      <a:tailEnd type="none" w="med" len="med"/>
+                    </a:lnT>
+                    <a:lnB w="9525" cap="flat" cmpd="sng" algn="ctr">
+                      <a:solidFill>
+                        <a:srgbClr val="666666"/>
+                      </a:solidFill>
+                      <a:prstDash val="solid"/>
+                      <a:round/>
+                      <a:headEnd type="none" w="med" len="med"/>
+                      <a:tailEnd type="none" w="med" len="med"/>
+                    </a:lnB>
+                  </a:tcPr>
+                </a:tc>
+                <a:tc>
+                  <a:txBody>
+                    <a:bodyPr/>
+                    <a:lstStyle/>
+                    <a:p>
+                      <a:r>
+                        <a:rPr lang="en-US" sz="1700" b="1" dirty="0">
+                          <a:effectLst/>
+                        </a:rPr>
+                        <a:t>NOTE</a:t>
+                      </a:r>
+                      <a:endParaRPr lang="en-US" sz="1700" dirty="0">
+                        <a:effectLst/>
+                      </a:endParaRPr>
+                    </a:p>
+                  </a:txBody>
+                  <a:tcPr marL="73818" marR="73818" marT="27682" marB="27682">
+                    <a:lnL w="9525" cap="flat" cmpd="sng" algn="ctr">
+                      <a:solidFill>
+                        <a:srgbClr val="666666"/>
+                      </a:solidFill>
+                      <a:prstDash val="solid"/>
+                      <a:round/>
+                      <a:headEnd type="none" w="med" len="med"/>
+                      <a:tailEnd type="none" w="med" len="med"/>
+                    </a:lnL>
+                    <a:lnR w="9525" cap="flat" cmpd="sng" algn="ctr">
+                      <a:solidFill>
+                        <a:srgbClr val="666666"/>
+                      </a:solidFill>
+                      <a:prstDash val="solid"/>
+                      <a:round/>
+                      <a:headEnd type="none" w="med" len="med"/>
+                      <a:tailEnd type="none" w="med" len="med"/>
+                    </a:lnR>
+                    <a:lnT w="9525" cap="flat" cmpd="sng" algn="ctr">
+                      <a:solidFill>
+                        <a:srgbClr val="666666"/>
+                      </a:solidFill>
+                      <a:prstDash val="solid"/>
+                      <a:round/>
+                      <a:headEnd type="none" w="med" len="med"/>
+                      <a:tailEnd type="none" w="med" len="med"/>
+                    </a:lnT>
+                    <a:lnB w="9525" cap="flat" cmpd="sng" algn="ctr">
+                      <a:solidFill>
+                        <a:srgbClr val="666666"/>
+                      </a:solidFill>
+                      <a:prstDash val="solid"/>
+                      <a:round/>
+                      <a:headEnd type="none" w="med" len="med"/>
+                      <a:tailEnd type="none" w="med" len="med"/>
+                    </a:lnB>
+                  </a:tcPr>
+                </a:tc>
+              </a:tr>
+              <a:tr h="321108">
+                <a:tc>
+                  <a:txBody>
+                    <a:bodyPr/>
+                    <a:lstStyle/>
+                    <a:p>
+                      <a:r>
+                        <a:rPr lang="zh-CN" altLang="en-US" sz="1700" dirty="0" smtClean="0">
+                          <a:effectLst/>
+                        </a:rPr>
+                        <a:t>开发标准化</a:t>
+                      </a:r>
+                      <a:endParaRPr lang="zh-CN" altLang="en-US" sz="1700" dirty="0">
+                        <a:effectLst/>
+                      </a:endParaRPr>
+                    </a:p>
+                  </a:txBody>
+                  <a:tcPr marL="73818" marR="73818" marT="27682" marB="27682">
+                    <a:lnL w="9525" cap="flat" cmpd="sng" algn="ctr">
+                      <a:solidFill>
+                        <a:srgbClr val="666666"/>
+                      </a:solidFill>
+                      <a:prstDash val="solid"/>
+                      <a:round/>
+                      <a:headEnd type="none" w="med" len="med"/>
+                      <a:tailEnd type="none" w="med" len="med"/>
+                    </a:lnL>
+                    <a:lnR w="9525" cap="flat" cmpd="sng" algn="ctr">
+                      <a:solidFill>
+                        <a:srgbClr val="666666"/>
+                      </a:solidFill>
+                      <a:prstDash val="solid"/>
+                      <a:round/>
+                      <a:headEnd type="none" w="med" len="med"/>
+                      <a:tailEnd type="none" w="med" len="med"/>
+                    </a:lnR>
+                    <a:lnT w="9525" cap="flat" cmpd="sng" algn="ctr">
+                      <a:solidFill>
+                        <a:srgbClr val="666666"/>
+                      </a:solidFill>
+                      <a:prstDash val="solid"/>
+                      <a:round/>
+                      <a:headEnd type="none" w="med" len="med"/>
+                      <a:tailEnd type="none" w="med" len="med"/>
+                    </a:lnT>
+                    <a:lnB w="9525" cap="flat" cmpd="sng" algn="ctr">
+                      <a:solidFill>
+                        <a:srgbClr val="666666"/>
+                      </a:solidFill>
+                      <a:prstDash val="solid"/>
+                      <a:round/>
+                      <a:headEnd type="none" w="med" len="med"/>
+                      <a:tailEnd type="none" w="med" len="med"/>
+                    </a:lnB>
+                  </a:tcPr>
+                </a:tc>
+                <a:tc>
+                  <a:txBody>
+                    <a:bodyPr/>
+                    <a:lstStyle/>
+                    <a:p>
+                      <a:endParaRPr lang="zh-CN" altLang="en-US" sz="1700" dirty="0">
+                        <a:effectLst/>
+                      </a:endParaRPr>
+                    </a:p>
+                  </a:txBody>
+                  <a:tcPr marL="73818" marR="73818" marT="27682" marB="27682">
+                    <a:lnL w="9525" cap="flat" cmpd="sng" algn="ctr">
+                      <a:solidFill>
+                        <a:srgbClr val="666666"/>
+                      </a:solidFill>
+                      <a:prstDash val="solid"/>
+                      <a:round/>
+                      <a:headEnd type="none" w="med" len="med"/>
+                      <a:tailEnd type="none" w="med" len="med"/>
+                    </a:lnL>
+                    <a:lnR w="9525" cap="flat" cmpd="sng" algn="ctr">
+                      <a:solidFill>
+                        <a:srgbClr val="666666"/>
+                      </a:solidFill>
+                      <a:prstDash val="solid"/>
+                      <a:round/>
+                      <a:headEnd type="none" w="med" len="med"/>
+                      <a:tailEnd type="none" w="med" len="med"/>
+                    </a:lnR>
+                    <a:lnT w="9525" cap="flat" cmpd="sng" algn="ctr">
+                      <a:solidFill>
+                        <a:srgbClr val="666666"/>
+                      </a:solidFill>
+                      <a:prstDash val="solid"/>
+                      <a:round/>
+                      <a:headEnd type="none" w="med" len="med"/>
+                      <a:tailEnd type="none" w="med" len="med"/>
+                    </a:lnT>
+                    <a:lnB w="9525" cap="flat" cmpd="sng" algn="ctr">
+                      <a:solidFill>
+                        <a:srgbClr val="666666"/>
+                      </a:solidFill>
+                      <a:prstDash val="solid"/>
+                      <a:round/>
+                      <a:headEnd type="none" w="med" len="med"/>
+                      <a:tailEnd type="none" w="med" len="med"/>
+                    </a:lnB>
+                  </a:tcPr>
+                </a:tc>
+                <a:tc>
+                  <a:txBody>
+                    <a:bodyPr/>
+                    <a:lstStyle/>
+                    <a:p>
+                      <a:endParaRPr lang="en-US" altLang="zh-CN" sz="1700" dirty="0" smtClean="0">
+                        <a:effectLst/>
+                      </a:endParaRPr>
+                    </a:p>
+                  </a:txBody>
+                  <a:tcPr marL="73818" marR="73818" marT="27682" marB="27682">
+                    <a:lnL w="9525" cap="flat" cmpd="sng" algn="ctr">
+                      <a:solidFill>
+                        <a:srgbClr val="666666"/>
+                      </a:solidFill>
+                      <a:prstDash val="solid"/>
+                      <a:round/>
+                      <a:headEnd type="none" w="med" len="med"/>
+                      <a:tailEnd type="none" w="med" len="med"/>
+                    </a:lnL>
+                    <a:lnR w="9525" cap="flat" cmpd="sng" algn="ctr">
+                      <a:solidFill>
+                        <a:srgbClr val="666666"/>
+                      </a:solidFill>
+                      <a:prstDash val="solid"/>
+                      <a:round/>
+                      <a:headEnd type="none" w="med" len="med"/>
+                      <a:tailEnd type="none" w="med" len="med"/>
+                    </a:lnR>
+                    <a:lnT w="9525" cap="flat" cmpd="sng" algn="ctr">
+                      <a:solidFill>
+                        <a:srgbClr val="666666"/>
+                      </a:solidFill>
+                      <a:prstDash val="solid"/>
+                      <a:round/>
+                      <a:headEnd type="none" w="med" len="med"/>
+                      <a:tailEnd type="none" w="med" len="med"/>
+                    </a:lnT>
+                    <a:lnB w="9525" cap="flat" cmpd="sng" algn="ctr">
+                      <a:solidFill>
+                        <a:srgbClr val="666666"/>
+                      </a:solidFill>
+                      <a:prstDash val="solid"/>
+                      <a:round/>
+                      <a:headEnd type="none" w="med" len="med"/>
+                      <a:tailEnd type="none" w="med" len="med"/>
+                    </a:lnB>
+                  </a:tcPr>
+                </a:tc>
+              </a:tr>
+              <a:tr h="321108">
+                <a:tc>
+                  <a:txBody>
+                    <a:bodyPr/>
+                    <a:lstStyle/>
+                    <a:p>
+                      <a:endParaRPr lang="zh-CN" altLang="en-US" sz="1700" dirty="0">
+                        <a:effectLst/>
+                      </a:endParaRPr>
+                    </a:p>
+                  </a:txBody>
+                  <a:tcPr marL="73818" marR="73818" marT="27682" marB="27682">
+                    <a:lnL w="9525" cap="flat" cmpd="sng" algn="ctr">
+                      <a:solidFill>
+                        <a:srgbClr val="666666"/>
+                      </a:solidFill>
+                      <a:prstDash val="solid"/>
+                      <a:round/>
+                      <a:headEnd type="none" w="med" len="med"/>
+                      <a:tailEnd type="none" w="med" len="med"/>
+                    </a:lnL>
+                    <a:lnR w="9525" cap="flat" cmpd="sng" algn="ctr">
+                      <a:solidFill>
+                        <a:srgbClr val="666666"/>
+                      </a:solidFill>
+                      <a:prstDash val="solid"/>
+                      <a:round/>
+                      <a:headEnd type="none" w="med" len="med"/>
+                      <a:tailEnd type="none" w="med" len="med"/>
+                    </a:lnR>
+                    <a:lnT w="9525" cap="flat" cmpd="sng" algn="ctr">
+                      <a:solidFill>
+                        <a:srgbClr val="666666"/>
+                      </a:solidFill>
+                      <a:prstDash val="solid"/>
+                      <a:round/>
+                      <a:headEnd type="none" w="med" len="med"/>
+                      <a:tailEnd type="none" w="med" len="med"/>
+                    </a:lnT>
+                    <a:lnB w="9525" cap="flat" cmpd="sng" algn="ctr">
+                      <a:solidFill>
+                        <a:srgbClr val="666666"/>
+                      </a:solidFill>
+                      <a:prstDash val="solid"/>
+                      <a:round/>
+                      <a:headEnd type="none" w="med" len="med"/>
+                      <a:tailEnd type="none" w="med" len="med"/>
+                    </a:lnB>
+                  </a:tcPr>
+                </a:tc>
+                <a:tc>
+                  <a:txBody>
+                    <a:bodyPr/>
+                    <a:lstStyle/>
+                    <a:p>
+                      <a:endParaRPr lang="zh-CN" altLang="en-US" sz="1700" dirty="0">
+                        <a:effectLst/>
+                      </a:endParaRPr>
+                    </a:p>
+                  </a:txBody>
+                  <a:tcPr marL="73818" marR="73818" marT="27682" marB="27682">
+                    <a:lnL w="9525" cap="flat" cmpd="sng" algn="ctr">
+                      <a:solidFill>
+                        <a:srgbClr val="666666"/>
+                      </a:solidFill>
+                      <a:prstDash val="solid"/>
+                      <a:round/>
+                      <a:headEnd type="none" w="med" len="med"/>
+                      <a:tailEnd type="none" w="med" len="med"/>
+                    </a:lnL>
+                    <a:lnR w="9525" cap="flat" cmpd="sng" algn="ctr">
+                      <a:solidFill>
+                        <a:srgbClr val="666666"/>
+                      </a:solidFill>
+                      <a:prstDash val="solid"/>
+                      <a:round/>
+                      <a:headEnd type="none" w="med" len="med"/>
+                      <a:tailEnd type="none" w="med" len="med"/>
+                    </a:lnR>
+                    <a:lnT w="9525" cap="flat" cmpd="sng" algn="ctr">
+                      <a:solidFill>
+                        <a:srgbClr val="666666"/>
+                      </a:solidFill>
+                      <a:prstDash val="solid"/>
+                      <a:round/>
+                      <a:headEnd type="none" w="med" len="med"/>
+                      <a:tailEnd type="none" w="med" len="med"/>
+                    </a:lnT>
+                    <a:lnB w="9525" cap="flat" cmpd="sng" algn="ctr">
+                      <a:solidFill>
+                        <a:srgbClr val="666666"/>
+                      </a:solidFill>
+                      <a:prstDash val="solid"/>
+                      <a:round/>
+                      <a:headEnd type="none" w="med" len="med"/>
+                      <a:tailEnd type="none" w="med" len="med"/>
+                    </a:lnB>
+                  </a:tcPr>
+                </a:tc>
+                <a:tc>
+                  <a:txBody>
+                    <a:bodyPr/>
+                    <a:lstStyle/>
+                    <a:p>
+                      <a:endParaRPr lang="en-US" altLang="zh-CN" sz="1700" dirty="0" smtClean="0">
+                        <a:effectLst/>
+                      </a:endParaRPr>
+                    </a:p>
+                  </a:txBody>
+                  <a:tcPr marL="73818" marR="73818" marT="27682" marB="27682">
+                    <a:lnL w="9525" cap="flat" cmpd="sng" algn="ctr">
+                      <a:solidFill>
+                        <a:srgbClr val="666666"/>
+                      </a:solidFill>
+                      <a:prstDash val="solid"/>
+                      <a:round/>
+                      <a:headEnd type="none" w="med" len="med"/>
+                      <a:tailEnd type="none" w="med" len="med"/>
+                    </a:lnL>
+                    <a:lnR w="9525" cap="flat" cmpd="sng" algn="ctr">
+                      <a:solidFill>
+                        <a:srgbClr val="666666"/>
+                      </a:solidFill>
+                      <a:prstDash val="solid"/>
+                      <a:round/>
+                      <a:headEnd type="none" w="med" len="med"/>
+                      <a:tailEnd type="none" w="med" len="med"/>
+                    </a:lnR>
+                    <a:lnT w="9525" cap="flat" cmpd="sng" algn="ctr">
+                      <a:solidFill>
+                        <a:srgbClr val="666666"/>
+                      </a:solidFill>
+                      <a:prstDash val="solid"/>
+                      <a:round/>
+                      <a:headEnd type="none" w="med" len="med"/>
+                      <a:tailEnd type="none" w="med" len="med"/>
+                    </a:lnT>
+                    <a:lnB w="9525" cap="flat" cmpd="sng" algn="ctr">
+                      <a:solidFill>
+                        <a:srgbClr val="666666"/>
+                      </a:solidFill>
+                      <a:prstDash val="solid"/>
+                      <a:round/>
+                      <a:headEnd type="none" w="med" len="med"/>
+                      <a:tailEnd type="none" w="med" len="med"/>
+                    </a:lnB>
+                  </a:tcPr>
+                </a:tc>
+              </a:tr>
+              <a:tr h="321108">
+                <a:tc>
+                  <a:txBody>
+                    <a:bodyPr/>
+                    <a:lstStyle/>
+                    <a:p>
+                      <a:endParaRPr lang="zh-CN" altLang="en-US" sz="1700" dirty="0">
+                        <a:effectLst/>
+                      </a:endParaRPr>
+                    </a:p>
+                  </a:txBody>
+                  <a:tcPr marL="73818" marR="73818" marT="27682" marB="27682">
+                    <a:lnL w="9525" cap="flat" cmpd="sng" algn="ctr">
+                      <a:solidFill>
+                        <a:srgbClr val="666666"/>
+                      </a:solidFill>
+                      <a:prstDash val="solid"/>
+                      <a:round/>
+                      <a:headEnd type="none" w="med" len="med"/>
+                      <a:tailEnd type="none" w="med" len="med"/>
+                    </a:lnL>
+                    <a:lnR w="9525" cap="flat" cmpd="sng" algn="ctr">
+                      <a:solidFill>
+                        <a:srgbClr val="666666"/>
+                      </a:solidFill>
+                      <a:prstDash val="solid"/>
+                      <a:round/>
+                      <a:headEnd type="none" w="med" len="med"/>
+                      <a:tailEnd type="none" w="med" len="med"/>
+                    </a:lnR>
+                    <a:lnT w="9525" cap="flat" cmpd="sng" algn="ctr">
+                      <a:solidFill>
+                        <a:srgbClr val="666666"/>
+                      </a:solidFill>
+                      <a:prstDash val="solid"/>
+                      <a:round/>
+                      <a:headEnd type="none" w="med" len="med"/>
+                      <a:tailEnd type="none" w="med" len="med"/>
+                    </a:lnT>
+                    <a:lnB w="9525" cap="flat" cmpd="sng" algn="ctr">
+                      <a:solidFill>
+                        <a:srgbClr val="666666"/>
+                      </a:solidFill>
+                      <a:prstDash val="solid"/>
+                      <a:round/>
+                      <a:headEnd type="none" w="med" len="med"/>
+                      <a:tailEnd type="none" w="med" len="med"/>
+                    </a:lnB>
+                  </a:tcPr>
+                </a:tc>
+                <a:tc>
+                  <a:txBody>
+                    <a:bodyPr/>
+                    <a:lstStyle/>
+                    <a:p>
+                      <a:endParaRPr lang="zh-CN" altLang="en-US" sz="1700" dirty="0">
+                        <a:effectLst/>
+                      </a:endParaRPr>
+                    </a:p>
+                  </a:txBody>
+                  <a:tcPr marL="73818" marR="73818" marT="27682" marB="27682">
+                    <a:lnL w="9525" cap="flat" cmpd="sng" algn="ctr">
+                      <a:solidFill>
+                        <a:srgbClr val="666666"/>
+                      </a:solidFill>
+                      <a:prstDash val="solid"/>
+                      <a:round/>
+                      <a:headEnd type="none" w="med" len="med"/>
+                      <a:tailEnd type="none" w="med" len="med"/>
+                    </a:lnL>
+                    <a:lnR w="9525" cap="flat" cmpd="sng" algn="ctr">
+                      <a:solidFill>
+                        <a:srgbClr val="666666"/>
+                      </a:solidFill>
+                      <a:prstDash val="solid"/>
+                      <a:round/>
+                      <a:headEnd type="none" w="med" len="med"/>
+                      <a:tailEnd type="none" w="med" len="med"/>
+                    </a:lnR>
+                    <a:lnT w="9525" cap="flat" cmpd="sng" algn="ctr">
+                      <a:solidFill>
+                        <a:srgbClr val="666666"/>
+                      </a:solidFill>
+                      <a:prstDash val="solid"/>
+                      <a:round/>
+                      <a:headEnd type="none" w="med" len="med"/>
+                      <a:tailEnd type="none" w="med" len="med"/>
+                    </a:lnT>
+                    <a:lnB w="9525" cap="flat" cmpd="sng" algn="ctr">
+                      <a:solidFill>
+                        <a:srgbClr val="666666"/>
+                      </a:solidFill>
+                      <a:prstDash val="solid"/>
+                      <a:round/>
+                      <a:headEnd type="none" w="med" len="med"/>
+                      <a:tailEnd type="none" w="med" len="med"/>
+                    </a:lnB>
+                  </a:tcPr>
+                </a:tc>
+                <a:tc>
+                  <a:txBody>
+                    <a:bodyPr/>
+                    <a:lstStyle/>
+                    <a:p>
+                      <a:endParaRPr lang="en-US" altLang="zh-CN" sz="1700" dirty="0" smtClean="0">
+                        <a:effectLst/>
+                      </a:endParaRPr>
+                    </a:p>
+                  </a:txBody>
+                  <a:tcPr marL="73818" marR="73818" marT="27682" marB="27682">
+                    <a:lnL w="9525" cap="flat" cmpd="sng" algn="ctr">
+                      <a:solidFill>
+                        <a:srgbClr val="666666"/>
+                      </a:solidFill>
+                      <a:prstDash val="solid"/>
+                      <a:round/>
+                      <a:headEnd type="none" w="med" len="med"/>
+                      <a:tailEnd type="none" w="med" len="med"/>
+                    </a:lnL>
+                    <a:lnR w="9525" cap="flat" cmpd="sng" algn="ctr">
+                      <a:solidFill>
+                        <a:srgbClr val="666666"/>
+                      </a:solidFill>
+                      <a:prstDash val="solid"/>
+                      <a:round/>
+                      <a:headEnd type="none" w="med" len="med"/>
+                      <a:tailEnd type="none" w="med" len="med"/>
+                    </a:lnR>
+                    <a:lnT w="9525" cap="flat" cmpd="sng" algn="ctr">
+                      <a:solidFill>
+                        <a:srgbClr val="666666"/>
+                      </a:solidFill>
+                      <a:prstDash val="solid"/>
+                      <a:round/>
+                      <a:headEnd type="none" w="med" len="med"/>
+                      <a:tailEnd type="none" w="med" len="med"/>
+                    </a:lnT>
+                    <a:lnB w="9525" cap="flat" cmpd="sng" algn="ctr">
+                      <a:solidFill>
+                        <a:srgbClr val="666666"/>
+                      </a:solidFill>
+                      <a:prstDash val="solid"/>
+                      <a:round/>
+                      <a:headEnd type="none" w="med" len="med"/>
+                      <a:tailEnd type="none" w="med" len="med"/>
+                    </a:lnB>
+                  </a:tcPr>
+                </a:tc>
+              </a:tr>
+              <a:tr h="321108">
+                <a:tc>
+                  <a:txBody>
+                    <a:bodyPr/>
+                    <a:lstStyle/>
+                    <a:p>
+                      <a:endParaRPr lang="zh-CN" altLang="en-US" sz="1700" dirty="0">
+                        <a:effectLst/>
+                      </a:endParaRPr>
+                    </a:p>
+                  </a:txBody>
+                  <a:tcPr marL="73818" marR="73818" marT="27682" marB="27682">
+                    <a:lnL w="9525" cap="flat" cmpd="sng" algn="ctr">
+                      <a:solidFill>
+                        <a:srgbClr val="666666"/>
+                      </a:solidFill>
+                      <a:prstDash val="solid"/>
+                      <a:round/>
+                      <a:headEnd type="none" w="med" len="med"/>
+                      <a:tailEnd type="none" w="med" len="med"/>
+                    </a:lnL>
+                    <a:lnR w="9525" cap="flat" cmpd="sng" algn="ctr">
+                      <a:solidFill>
+                        <a:srgbClr val="666666"/>
+                      </a:solidFill>
+                      <a:prstDash val="solid"/>
+                      <a:round/>
+                      <a:headEnd type="none" w="med" len="med"/>
+                      <a:tailEnd type="none" w="med" len="med"/>
+                    </a:lnR>
+                    <a:lnT w="9525" cap="flat" cmpd="sng" algn="ctr">
+                      <a:solidFill>
+                        <a:srgbClr val="666666"/>
+                      </a:solidFill>
+                      <a:prstDash val="solid"/>
+                      <a:round/>
+                      <a:headEnd type="none" w="med" len="med"/>
+                      <a:tailEnd type="none" w="med" len="med"/>
+                    </a:lnT>
+                    <a:lnB w="9525" cap="flat" cmpd="sng" algn="ctr">
+                      <a:solidFill>
+                        <a:srgbClr val="666666"/>
+                      </a:solidFill>
+                      <a:prstDash val="solid"/>
+                      <a:round/>
+                      <a:headEnd type="none" w="med" len="med"/>
+                      <a:tailEnd type="none" w="med" len="med"/>
+                    </a:lnB>
+                  </a:tcPr>
+                </a:tc>
+                <a:tc>
+                  <a:txBody>
+                    <a:bodyPr/>
+                    <a:lstStyle/>
+                    <a:p>
+                      <a:endParaRPr lang="zh-CN" altLang="en-US" sz="1700" dirty="0">
+                        <a:effectLst/>
+                      </a:endParaRPr>
+                    </a:p>
+                  </a:txBody>
+                  <a:tcPr marL="73818" marR="73818" marT="27682" marB="27682">
+                    <a:lnL w="9525" cap="flat" cmpd="sng" algn="ctr">
+                      <a:solidFill>
+                        <a:srgbClr val="666666"/>
+                      </a:solidFill>
+                      <a:prstDash val="solid"/>
+                      <a:round/>
+                      <a:headEnd type="none" w="med" len="med"/>
+                      <a:tailEnd type="none" w="med" len="med"/>
+                    </a:lnL>
+                    <a:lnR w="9525" cap="flat" cmpd="sng" algn="ctr">
+                      <a:solidFill>
+                        <a:srgbClr val="666666"/>
+                      </a:solidFill>
+                      <a:prstDash val="solid"/>
+                      <a:round/>
+                      <a:headEnd type="none" w="med" len="med"/>
+                      <a:tailEnd type="none" w="med" len="med"/>
+                    </a:lnR>
+                    <a:lnT w="9525" cap="flat" cmpd="sng" algn="ctr">
+                      <a:solidFill>
+                        <a:srgbClr val="666666"/>
+                      </a:solidFill>
+                      <a:prstDash val="solid"/>
+                      <a:round/>
+                      <a:headEnd type="none" w="med" len="med"/>
+                      <a:tailEnd type="none" w="med" len="med"/>
+                    </a:lnT>
+                    <a:lnB w="9525" cap="flat" cmpd="sng" algn="ctr">
+                      <a:solidFill>
+                        <a:srgbClr val="666666"/>
+                      </a:solidFill>
+                      <a:prstDash val="solid"/>
+                      <a:round/>
+                      <a:headEnd type="none" w="med" len="med"/>
+                      <a:tailEnd type="none" w="med" len="med"/>
+                    </a:lnB>
+                  </a:tcPr>
+                </a:tc>
+                <a:tc>
+                  <a:txBody>
+                    <a:bodyPr/>
+                    <a:lstStyle/>
+                    <a:p>
+                      <a:endParaRPr lang="en-US" altLang="zh-CN" sz="1700" dirty="0" smtClean="0">
+                        <a:effectLst/>
+                      </a:endParaRPr>
+                    </a:p>
+                  </a:txBody>
+                  <a:tcPr marL="73818" marR="73818" marT="27682" marB="27682">
+                    <a:lnL w="9525" cap="flat" cmpd="sng" algn="ctr">
+                      <a:solidFill>
+                        <a:srgbClr val="666666"/>
+                      </a:solidFill>
+                      <a:prstDash val="solid"/>
+                      <a:round/>
+                      <a:headEnd type="none" w="med" len="med"/>
+                      <a:tailEnd type="none" w="med" len="med"/>
+                    </a:lnL>
+                    <a:lnR w="9525" cap="flat" cmpd="sng" algn="ctr">
+                      <a:solidFill>
+                        <a:srgbClr val="666666"/>
+                      </a:solidFill>
+                      <a:prstDash val="solid"/>
+                      <a:round/>
+                      <a:headEnd type="none" w="med" len="med"/>
+                      <a:tailEnd type="none" w="med" len="med"/>
+                    </a:lnR>
+                    <a:lnT w="9525" cap="flat" cmpd="sng" algn="ctr">
+                      <a:solidFill>
+                        <a:srgbClr val="666666"/>
+                      </a:solidFill>
+                      <a:prstDash val="solid"/>
+                      <a:round/>
+                      <a:headEnd type="none" w="med" len="med"/>
+                      <a:tailEnd type="none" w="med" len="med"/>
+                    </a:lnT>
+                    <a:lnB w="9525" cap="flat" cmpd="sng" algn="ctr">
+                      <a:solidFill>
+                        <a:srgbClr val="666666"/>
+                      </a:solidFill>
+                      <a:prstDash val="solid"/>
+                      <a:round/>
+                      <a:headEnd type="none" w="med" len="med"/>
+                      <a:tailEnd type="none" w="med" len="med"/>
+                    </a:lnB>
+                  </a:tcPr>
+                </a:tc>
+              </a:tr>
+            </a:tbl>
+          </a:graphicData>
+        </a:graphic>
+      </p:graphicFrame>
+    </p:spTree>
+    <p:extLst>
+      <p:ext uri="{BB962C8B-B14F-4D97-AF65-F5344CB8AC3E}">
+        <p14:creationId xmlns:p14="http://schemas.microsoft.com/office/powerpoint/2010/main" val="1410930156"/>
+      </p:ext>
+    </p:extLst>
+  </p:cSld>
+  <p:clrMapOvr>
+    <a:masterClrMapping/>
+  </p:clrMapOvr>
+  <p:timing>
+    <p:tnLst>
+      <p:par>
+        <p:cTn id="1" dur="indefinite" restart="never" nodeType="tmRoot"/>
+      </p:par>
+    </p:tnLst>
+  </p:timing>
+</p:sld>
+</file>
+
+<file path=ppt/slides/slide14.xml><?xml version="1.0" encoding="utf-8"?>
+<p:sld xmlns:a="http://schemas.openxmlformats.org/drawingml/2006/main" xmlns:r="http://schemas.openxmlformats.org/officeDocument/2006/relationships" xmlns:p="http://schemas.openxmlformats.org/presentationml/2006/main">
+  <p:cSld>
+    <p:spTree>
+      <p:nvGrpSpPr>
+        <p:cNvPr id="1" name=""/>
+        <p:cNvGrpSpPr/>
+        <p:nvPr/>
+      </p:nvGrpSpPr>
+      <p:grpSpPr>
+        <a:xfrm>
+          <a:off x="0" y="0"/>
+          <a:ext cx="0" cy="0"/>
+          <a:chOff x="0" y="0"/>
+          <a:chExt cx="0" cy="0"/>
+        </a:xfrm>
+      </p:grpSpPr>
+      <p:pic>
+        <p:nvPicPr>
+          <p:cNvPr id="3" name="Picture 2" descr="http://www.eastime.com.cn/images/index_06.jpg"/>
+          <p:cNvPicPr>
+            <a:picLocks noChangeAspect="1" noChangeArrowheads="1"/>
+          </p:cNvPicPr>
+          <p:nvPr/>
+        </p:nvPicPr>
+        <p:blipFill>
+          <a:blip r:embed="rId3">
+            <a:extLst>
+              <a:ext uri="{28A0092B-C50C-407E-A947-70E740481C1C}">
+                <a14:useLocalDpi xmlns:a14="http://schemas.microsoft.com/office/drawing/2010/main" val="0"/>
+              </a:ext>
+            </a:extLst>
+          </a:blip>
+          <a:srcRect/>
+          <a:stretch>
+            <a:fillRect/>
+          </a:stretch>
+        </p:blipFill>
+        <p:spPr bwMode="auto">
+          <a:xfrm>
+            <a:off x="4320877" y="2593603"/>
+            <a:ext cx="2446663" cy="792088"/>
+          </a:xfrm>
+          <a:prstGeom prst="rect">
+            <a:avLst/>
+          </a:prstGeom>
+          <a:noFill/>
+          <a:extLst>
+            <a:ext uri="{909E8E84-426E-40DD-AFC4-6F175D3DCCD1}">
+              <a14:hiddenFill xmlns:a14="http://schemas.microsoft.com/office/drawing/2010/main">
+                <a:solidFill>
+                  <a:srgbClr val="FFFFFF"/>
+                </a:solidFill>
+              </a14:hiddenFill>
+            </a:ext>
+          </a:extLst>
         </p:spPr>
       </p:pic>
     </p:spTree>
@@ -8317,39 +10023,34 @@
             </a:r>
             <a:r>
               <a:rPr lang="zh-CN" altLang="en-US" dirty="0" smtClean="0"/>
-              <a:t>程序结构</a:t>
+              <a:t>程序结构 </a:t>
+            </a:r>
+            <a:endParaRPr lang="en-US" altLang="zh-CN" dirty="0" smtClean="0"/>
+          </a:p>
+          <a:p>
+            <a:endParaRPr lang="en-US" altLang="zh-CN" dirty="0"/>
+          </a:p>
+          <a:p>
+            <a:r>
+              <a:rPr lang="en-US" altLang="zh-CN" dirty="0"/>
+              <a:t>5</a:t>
+            </a:r>
+            <a:r>
+              <a:rPr lang="zh-CN" altLang="en-US" dirty="0" smtClean="0"/>
+              <a:t>、</a:t>
+            </a:r>
+            <a:r>
+              <a:rPr lang="en-US" altLang="zh-CN" dirty="0" smtClean="0"/>
+              <a:t>Ionic</a:t>
             </a:r>
             <a:r>
               <a:rPr lang="zh-CN" altLang="en-US" dirty="0" smtClean="0"/>
               <a:t> </a:t>
             </a:r>
-            <a:endParaRPr lang="en-US" altLang="zh-CN" dirty="0" smtClean="0"/>
-          </a:p>
-          <a:p>
-            <a:endParaRPr lang="en-US" altLang="zh-CN" dirty="0"/>
-          </a:p>
-          <a:p>
-            <a:r>
-              <a:rPr lang="en-US" altLang="zh-CN" dirty="0"/>
-              <a:t>5</a:t>
-            </a:r>
-            <a:r>
-              <a:rPr lang="zh-CN" altLang="en-US" dirty="0" smtClean="0"/>
-              <a:t>、</a:t>
-            </a:r>
-            <a:r>
-              <a:rPr lang="en-US" altLang="zh-CN" dirty="0" smtClean="0"/>
-              <a:t>Ionic</a:t>
-            </a:r>
-            <a:r>
-              <a:rPr lang="zh-CN" altLang="en-US" dirty="0" smtClean="0"/>
-              <a:t> </a:t>
-            </a:r>
             <a:r>
               <a:rPr lang="en-US" altLang="zh-CN" dirty="0" smtClean="0"/>
               <a:t>CSS</a:t>
             </a:r>
-            <a:endParaRPr lang="en-US" altLang="zh-CN" dirty="0" smtClean="0"/>
           </a:p>
           <a:p>
             <a:endParaRPr lang="en-US" altLang="zh-CN" dirty="0"/>
@@ -8448,17 +10149,7 @@
                 <a:latin typeface="+mj-ea"/>
                 <a:ea typeface="+mj-ea"/>
               </a:rPr>
-              <a:t>一</a:t>
-            </a:r>
-            <a:r>
-              <a:rPr lang="zh-CN" altLang="en-US" dirty="0" smtClean="0">
-                <a:solidFill>
-                  <a:srgbClr val="18A2EF"/>
-                </a:solidFill>
-                <a:latin typeface="+mj-ea"/>
-                <a:ea typeface="+mj-ea"/>
-              </a:rPr>
-              <a:t>、移动端</a:t>
+              <a:t>一、移动端</a:t>
             </a:r>
             <a:r>
               <a:rPr lang="en-US" altLang="zh-CN" dirty="0" smtClean="0">
@@ -8765,7 +10456,19 @@
             </a:r>
             <a:r>
               <a:rPr lang="zh-CN" altLang="en-US" sz="2000" dirty="0"/>
-              <a:t>，不需要下载安装。类似于现在所说的轻应用。生存在浏览器中的应用，基本上可以说是触屏版的网页应用</a:t>
+              <a:t>，不需要</a:t>
+            </a:r>
+            <a:r>
+              <a:rPr lang="zh-CN" altLang="en-US" sz="2000"/>
+              <a:t>下载</a:t>
+            </a:r>
+            <a:r>
+              <a:rPr lang="zh-CN" altLang="en-US" sz="2000" smtClean="0"/>
+              <a:t>安装。</a:t>
+            </a:r>
+            <a:r>
+              <a:rPr lang="zh-CN" altLang="en-US" sz="2000" dirty="0"/>
+              <a:t>生存在浏览器中的应用，基本上可以说是触屏版的网页应用</a:t>
             </a:r>
             <a:r>
               <a:rPr lang="zh-CN" altLang="en-US" sz="2000" dirty="0" smtClean="0"/>
@@ -8780,18 +10483,18 @@
           <a:p>
             <a:pPr algn="just"/>
             <a:r>
-              <a:rPr lang="en-US" altLang="zh-CN" sz="2000" b="1" kern="100" dirty="0">
+              <a:rPr lang="zh-CN" altLang="en-US" sz="2000" b="1" kern="100" dirty="0" smtClean="0">
                 <a:latin typeface="Times New Roman" panose="02020603050405020304" pitchFamily="18" charset="0"/>
                 <a:cs typeface="Times New Roman" panose="02020603050405020304" pitchFamily="18" charset="0"/>
               </a:rPr>
-              <a:t>Cordova</a:t>
+              <a:t>参考</a:t>
             </a:r>
             <a:r>
               <a:rPr lang="zh-CN" altLang="en-US" sz="2000" b="1" kern="100" dirty="0">
                 <a:latin typeface="Times New Roman" panose="02020603050405020304" pitchFamily="18" charset="0"/>
                 <a:cs typeface="Times New Roman" panose="02020603050405020304" pitchFamily="18" charset="0"/>
               </a:rPr>
-              <a:t> 参考材料</a:t>
+              <a:t>材料</a:t>
             </a:r>
             <a:r>
               <a:rPr lang="zh-CN" altLang="zh-CN" sz="2000" b="1" kern="100" dirty="0" smtClean="0">
@@ -13644,7 +15347,7 @@
                 <a:latin typeface="+mj-ea"/>
                 <a:ea typeface="+mj-ea"/>
               </a:rPr>
-              <a:t>创建程序</a:t>
+              <a:t>开发环境搭建</a:t>
             </a:r>
             <a:endParaRPr lang="zh-CN" altLang="en-US" dirty="0">
               <a:solidFill>
@@ -13658,14 +15361,14 @@
       </p:sp>
       <p:sp>
         <p:nvSpPr>
-          <p:cNvPr id="5" name="矩形 4"/>
+          <p:cNvPr id="4" name="矩形 3"/>
           <p:cNvSpPr/>
           <p:nvPr/>
         </p:nvSpPr>
         <p:spPr>
           <a:xfrm>
-            <a:off x="412011" y="1081435"/>
-            <a:ext cx="9093441" cy="3477875"/>
+            <a:off x="409208" y="1009427"/>
+            <a:ext cx="9093441" cy="400110"/>
           </a:xfrm>
           <a:prstGeom prst="rect">
             <a:avLst/>
@@ -13679,6 +15382,13 @@
           <a:p>
             <a:pPr algn="just"/>
             <a:r>
+              <a:rPr lang="en-US" altLang="zh-CN" sz="2000" b="1" kern="100" dirty="0" smtClean="0">
+                <a:latin typeface="Times New Roman" panose="02020603050405020304" pitchFamily="18" charset="0"/>
+                <a:cs typeface="Times New Roman" panose="02020603050405020304" pitchFamily="18" charset="0"/>
+              </a:rPr>
+              <a:t>Windows</a:t>
+            </a:r>
+            <a:r>
               <a:rPr lang="zh-CN" altLang="en-US" sz="2000" b="1" kern="100" dirty="0" smtClean="0">
                 <a:latin typeface="Times New Roman" panose="02020603050405020304" pitchFamily="18" charset="0"/>
                 <a:cs typeface="Times New Roman" panose="02020603050405020304" pitchFamily="18" charset="0"/>
@@ -13692,197 +15402,74 @@
               </a:rPr>
               <a:t>：</a:t>
             </a:r>
-            <a:endParaRPr lang="en-US" altLang="zh-CN" sz="2000" dirty="0"/>
-          </a:p>
-          <a:p>
-            <a:r>
-              <a:rPr lang="en-US" altLang="zh-CN" sz="2000" dirty="0" smtClean="0"/>
-              <a:t>1</a:t>
-            </a:r>
-            <a:r>
-              <a:rPr lang="zh-CN" altLang="en-US" sz="2000" dirty="0" smtClean="0"/>
-              <a:t>、</a:t>
-            </a:r>
-            <a:r>
-              <a:rPr lang="zh-CN" altLang="en-US" sz="2000" dirty="0"/>
-              <a:t>创建程序</a:t>
-            </a:r>
-          </a:p>
-          <a:p>
-            <a:r>
-              <a:rPr lang="en-US" altLang="zh-CN" sz="2000" dirty="0"/>
-              <a:t>	ionic start </a:t>
-            </a:r>
-            <a:r>
-              <a:rPr lang="en-US" altLang="zh-CN" sz="2000" dirty="0" err="1"/>
-              <a:t>myApp</a:t>
-            </a:r>
-            <a:r>
-              <a:rPr lang="en-US" altLang="zh-CN" sz="2000" dirty="0"/>
-              <a:t> </a:t>
-            </a:r>
-            <a:r>
-              <a:rPr lang="en-US" altLang="zh-CN" sz="2000" dirty="0" smtClean="0"/>
-              <a:t>tabs</a:t>
-            </a:r>
-            <a:r>
-              <a:rPr lang="zh-CN" altLang="en-US" sz="2000" dirty="0" smtClean="0"/>
-              <a:t> </a:t>
-            </a:r>
-            <a:r>
-              <a:rPr lang="mr-IN" altLang="zh-CN" sz="2000" dirty="0" smtClean="0"/>
-              <a:t>–</a:t>
-            </a:r>
-            <a:r>
-              <a:rPr lang="en-US" altLang="zh-CN" sz="2000" dirty="0" smtClean="0"/>
-              <a:t>type=ionic1</a:t>
-            </a:r>
-            <a:endParaRPr lang="en-US" altLang="zh-CN" sz="2000" dirty="0"/>
-          </a:p>
-          <a:p>
-            <a:r>
-              <a:rPr lang="en-US" altLang="zh-CN" sz="2000" dirty="0" smtClean="0"/>
-              <a:t>2</a:t>
-            </a:r>
-            <a:r>
-              <a:rPr lang="zh-CN" altLang="en-US" sz="2000" dirty="0" smtClean="0"/>
-              <a:t>、</a:t>
-            </a:r>
-            <a:r>
-              <a:rPr lang="zh-CN" altLang="en-US" sz="2000" dirty="0"/>
-              <a:t>运行程序</a:t>
-            </a:r>
-          </a:p>
-          <a:p>
-            <a:r>
-              <a:rPr lang="en-US" altLang="zh-CN" sz="2000" dirty="0"/>
-              <a:t>	cd </a:t>
-            </a:r>
-            <a:r>
-              <a:rPr lang="en-US" altLang="zh-CN" sz="2000" dirty="0" err="1"/>
-              <a:t>myApp</a:t>
-            </a:r>
-            <a:endParaRPr lang="en-US" altLang="zh-CN" sz="2000" dirty="0"/>
-          </a:p>
-          <a:p>
-            <a:r>
-              <a:rPr lang="en-US" altLang="zh-CN" sz="2000" dirty="0"/>
-              <a:t>	ionic </a:t>
-            </a:r>
-            <a:r>
-              <a:rPr lang="en-US" altLang="zh-CN" sz="2000" dirty="0" smtClean="0"/>
-              <a:t>serve</a:t>
-            </a:r>
-          </a:p>
-          <a:p>
-            <a:r>
-              <a:rPr lang="en-US" altLang="zh-CN" sz="2000" dirty="0" smtClean="0"/>
-              <a:t>3</a:t>
-            </a:r>
-            <a:r>
-              <a:rPr lang="zh-CN" altLang="en-US" sz="2000" dirty="0" smtClean="0"/>
-              <a:t>、添加平台</a:t>
-            </a:r>
-            <a:endParaRPr lang="en-US" altLang="zh-CN" sz="2000" dirty="0" smtClean="0"/>
-          </a:p>
-          <a:p>
-            <a:r>
-              <a:rPr lang="en-US" altLang="zh-CN" sz="2000" dirty="0"/>
-              <a:t>	</a:t>
-            </a:r>
-            <a:r>
-              <a:rPr lang="en-US" altLang="zh-CN" sz="2000" dirty="0" smtClean="0"/>
-              <a:t>ionic</a:t>
-            </a:r>
-            <a:r>
-              <a:rPr lang="zh-CN" altLang="en-US" sz="2000" dirty="0" smtClean="0"/>
-              <a:t> </a:t>
-            </a:r>
-            <a:r>
-              <a:rPr lang="en-US" altLang="zh-CN" sz="2000" dirty="0" smtClean="0"/>
-              <a:t>platform</a:t>
-            </a:r>
-            <a:r>
-              <a:rPr lang="zh-CN" altLang="en-US" sz="2000" dirty="0" smtClean="0"/>
-              <a:t> </a:t>
-            </a:r>
-            <a:r>
-              <a:rPr lang="en-US" altLang="zh-CN" sz="2000" dirty="0" smtClean="0"/>
-              <a:t>add</a:t>
-            </a:r>
-            <a:r>
-              <a:rPr lang="zh-CN" altLang="en-US" sz="2000" dirty="0" smtClean="0"/>
-              <a:t> </a:t>
-            </a:r>
-            <a:r>
-              <a:rPr lang="en-US" altLang="zh-CN" sz="2000" dirty="0" smtClean="0"/>
-              <a:t>android</a:t>
-            </a:r>
-          </a:p>
-          <a:p>
-            <a:r>
-              <a:rPr lang="en-US" altLang="zh-CN" sz="2000" dirty="0" smtClean="0"/>
-              <a:t>4</a:t>
-            </a:r>
-            <a:r>
-              <a:rPr lang="zh-CN" altLang="en-US" sz="2000" dirty="0" smtClean="0"/>
-              <a:t>、编译</a:t>
-            </a:r>
-            <a:r>
-              <a:rPr lang="en-US" altLang="zh-CN" sz="2000" dirty="0" err="1" smtClean="0"/>
-              <a:t>apk</a:t>
-            </a:r>
-            <a:endParaRPr lang="en-US" altLang="zh-CN" sz="2000" dirty="0" smtClean="0"/>
-          </a:p>
-          <a:p>
-            <a:r>
-              <a:rPr lang="en-US" altLang="zh-CN" sz="2000" dirty="0"/>
-              <a:t>	</a:t>
-            </a:r>
-            <a:r>
-              <a:rPr lang="en-US" altLang="zh-CN" sz="2000" dirty="0" err="1" smtClean="0"/>
-              <a:t>inoic</a:t>
-            </a:r>
-            <a:r>
-              <a:rPr lang="zh-CN" altLang="en-US" sz="2000" dirty="0"/>
-              <a:t> </a:t>
-            </a:r>
-            <a:r>
-              <a:rPr lang="en-US" altLang="zh-CN" sz="2000" dirty="0" err="1" smtClean="0"/>
-              <a:t>corvoda</a:t>
-            </a:r>
-            <a:r>
-              <a:rPr lang="zh-CN" altLang="en-US" sz="2000" dirty="0" smtClean="0"/>
-              <a:t> </a:t>
-            </a:r>
-            <a:r>
-              <a:rPr lang="en-US" altLang="zh-CN" sz="2000" dirty="0" smtClean="0"/>
-              <a:t>build</a:t>
-            </a:r>
-            <a:r>
-              <a:rPr lang="zh-CN" altLang="en-US" sz="2000" dirty="0" smtClean="0"/>
-              <a:t> </a:t>
-            </a:r>
-            <a:r>
-              <a:rPr lang="en-US" altLang="zh-CN" sz="2000" dirty="0" smtClean="0"/>
-              <a:t>android</a:t>
-            </a:r>
-            <a:r>
-              <a:rPr lang="zh-CN" altLang="en-US" sz="2000" dirty="0" smtClean="0"/>
-              <a:t> </a:t>
-            </a:r>
-            <a:endParaRPr lang="en-US" altLang="zh-CN" sz="2000" dirty="0"/>
-          </a:p>
-          <a:p>
-            <a:pPr algn="just"/>
-            <a:endParaRPr lang="zh-CN" altLang="en-US" sz="2000" dirty="0"/>
+            <a:endParaRPr lang="en-US" altLang="zh-CN" sz="2000" b="1" kern="100" dirty="0" smtClean="0">
+              <a:latin typeface="Times New Roman" panose="02020603050405020304" pitchFamily="18" charset="0"/>
+              <a:cs typeface="Times New Roman" panose="02020603050405020304" pitchFamily="18" charset="0"/>
+            </a:endParaRPr>
           </a:p>
         </p:txBody>
       </p:sp>
+      <p:graphicFrame>
+        <p:nvGraphicFramePr>
+          <p:cNvPr id="5" name="对象 4"/>
+          <p:cNvGraphicFramePr>
+            <a:graphicFrameLocks noChangeAspect="1"/>
+          </p:cNvGraphicFramePr>
+          <p:nvPr>
+            <p:extLst>
+              <p:ext uri="{D42A27DB-BD31-4B8C-83A1-F6EECF244321}">
+                <p14:modId xmlns:p14="http://schemas.microsoft.com/office/powerpoint/2010/main" val="1545971109"/>
+              </p:ext>
+            </p:extLst>
+          </p:nvPr>
+        </p:nvGraphicFramePr>
+        <p:xfrm>
+          <a:off x="2376661" y="1513483"/>
+          <a:ext cx="965200" cy="609600"/>
+        </p:xfrm>
+        <a:graphic>
+          <a:graphicData uri="http://schemas.openxmlformats.org/presentationml/2006/ole">
+            <mc:AlternateContent xmlns:mc="http://schemas.openxmlformats.org/markup-compatibility/2006">
+              <mc:Choice xmlns:v="urn:schemas-microsoft-com:vml" Requires="v">
+                <p:oleObj spid="_x0000_s1029" name="文档" showAsIcon="1" r:id="rId4" imgW="965200" imgH="609600" progId="Word.Document.8">
+                  <p:embed/>
+                </p:oleObj>
+              </mc:Choice>
+              <mc:Fallback>
+                <p:oleObj name="文档" showAsIcon="1" r:id="rId4" imgW="965200" imgH="609600" progId="Word.Document.8">
+                  <p:embed/>
+                  <p:pic>
+                    <p:nvPicPr>
+                      <p:cNvPr id="0" name=""/>
+                      <p:cNvPicPr/>
+                      <p:nvPr/>
+                    </p:nvPicPr>
+                    <p:blipFill>
+                      <a:blip r:embed="rId5"/>
+                      <a:stretch>
+                        <a:fillRect/>
+                      </a:stretch>
+                    </p:blipFill>
+                    <p:spPr>
+                      <a:xfrm>
+                        <a:off x="2376661" y="1513483"/>
+                        <a:ext cx="965200" cy="609600"/>
+                      </a:xfrm>
+                      <a:prstGeom prst="rect">
+                        <a:avLst/>
+                      </a:prstGeom>
+                    </p:spPr>
+                  </p:pic>
+                </p:oleObj>
+              </mc:Fallback>
+            </mc:AlternateContent>
+          </a:graphicData>
+        </a:graphic>
+      </p:graphicFrame>
     </p:spTree>
     <p:extLst>
       <p:ext uri="{BB962C8B-B14F-4D97-AF65-F5344CB8AC3E}">
-        <p14:creationId xmlns:p14="http://schemas.microsoft.com/office/powerpoint/2010/main" val="1699215617"/>
+        <p14:creationId xmlns:p14="http://schemas.microsoft.com/office/powerpoint/2010/main" val="1529824603"/>
       </p:ext>
     </p:extLst>
   </p:cSld>
@@ -13932,6 +15519,16 @@
           <a:lstStyle/>
           <a:p>
             <a:r>
+              <a:rPr lang="en-US" altLang="zh-CN" dirty="0" smtClean="0">
+                <a:solidFill>
+                  <a:srgbClr val="18A2EF"/>
+                </a:solidFill>
+                <a:latin typeface="+mj-ea"/>
+                <a:ea typeface="+mj-ea"/>
+              </a:rPr>
+              <a:t>Ionic</a:t>
+            </a:r>
+            <a:r>
               <a:rPr lang="zh-CN" altLang="en-US" dirty="0" smtClean="0">
                 <a:solidFill>
                   <a:srgbClr val="18A2EF"/>
@@ -13939,17 +15536,7 @@
                 <a:latin typeface="+mj-ea"/>
                 <a:ea typeface="+mj-ea"/>
               </a:rPr>
-              <a:t>四、</a:t>
-            </a:r>
-            <a:r>
-              <a:rPr lang="zh-CN" altLang="en-US" dirty="0" smtClean="0">
-                <a:solidFill>
-                  <a:srgbClr val="18A2EF"/>
-                </a:solidFill>
-                <a:latin typeface="+mj-ea"/>
-                <a:ea typeface="+mj-ea"/>
-              </a:rPr>
-              <a:t>程序结构</a:t>
+              <a:t>创建程序</a:t>
             </a:r>
             <a:endParaRPr lang="zh-CN" altLang="en-US" dirty="0">
               <a:solidFill>
@@ -14187,7 +15774,7 @@
     </p:spTree>
     <p:extLst>
       <p:ext uri="{BB962C8B-B14F-4D97-AF65-F5344CB8AC3E}">
-        <p14:creationId xmlns:p14="http://schemas.microsoft.com/office/powerpoint/2010/main" val="1567986065"/>
+        <p14:creationId xmlns:p14="http://schemas.microsoft.com/office/powerpoint/2010/main" val="1699215617"/>
       </p:ext>
     </p:extLst>
   </p:cSld>
@@ -14231,16 +15818,9 @@
             <p:ph type="title"/>
           </p:nvPr>
         </p:nvSpPr>
-        <p:spPr>
-          <a:xfrm>
-            <a:off x="432445" y="649387"/>
-            <a:ext cx="9937790" cy="513899"/>
-          </a:xfrm>
-        </p:spPr>
+        <p:spPr/>
         <p:txBody>
-          <a:bodyPr>
-            <a:normAutofit fontScale="90000"/>
-          </a:bodyPr>
+          <a:bodyPr/>
           <a:lstStyle/>
           <a:p>
             <a:r>
@@ -14248,851 +15828,73 @@
                 <a:solidFill>
                   <a:srgbClr val="18A2EF"/>
                 </a:solidFill>
+                <a:latin typeface="+mj-ea"/>
+                <a:ea typeface="+mj-ea"/>
               </a:rPr>
-              <a:t>遗留</a:t>
+              <a:t>四、程序结构</a:t>
             </a:r>
             <a:endParaRPr lang="zh-CN" altLang="en-US" dirty="0">
               <a:solidFill>
                 <a:srgbClr val="18A2EF"/>
               </a:solidFill>
+              <a:latin typeface="+mj-ea"/>
+              <a:ea typeface="+mj-ea"/>
             </a:endParaRPr>
           </a:p>
         </p:txBody>
       </p:sp>
-      <p:graphicFrame>
-        <p:nvGraphicFramePr>
-          <p:cNvPr id="2" name="表格 1"/>
-          <p:cNvGraphicFramePr>
-            <a:graphicFrameLocks noGrp="1"/>
-          </p:cNvGraphicFramePr>
-          <p:nvPr>
-            <p:extLst>
-              <p:ext uri="{D42A27DB-BD31-4B8C-83A1-F6EECF244321}">
-                <p14:modId xmlns:p14="http://schemas.microsoft.com/office/powerpoint/2010/main" val="2117900946"/>
-              </p:ext>
-            </p:extLst>
-          </p:nvPr>
-        </p:nvGraphicFramePr>
-        <p:xfrm>
-          <a:off x="648469" y="2449587"/>
-          <a:ext cx="10513168" cy="1598876"/>
-        </p:xfrm>
-        <a:graphic>
-          <a:graphicData uri="http://schemas.openxmlformats.org/drawingml/2006/table">
-            <a:tbl>
-              <a:tblPr/>
-              <a:tblGrid>
-                <a:gridCol w="2474290"/>
-                <a:gridCol w="4763779"/>
-                <a:gridCol w="3275099"/>
-              </a:tblGrid>
-              <a:tr h="249100">
-                <a:tc>
-                  <a:txBody>
-                    <a:bodyPr/>
-                    <a:lstStyle/>
-                    <a:p>
-                      <a:r>
-                        <a:rPr lang="zh-CN" altLang="en-US" sz="1700" b="1" dirty="0" smtClean="0">
-                          <a:effectLst/>
-                        </a:rPr>
-                        <a:t>问题</a:t>
-                      </a:r>
-                      <a:endParaRPr lang="en-US" sz="1700" dirty="0">
-                        <a:effectLst/>
-                      </a:endParaRPr>
-                    </a:p>
-                  </a:txBody>
-                  <a:tcPr marL="73818" marR="73818" marT="27682" marB="27682">
-                    <a:lnL w="9525" cap="flat" cmpd="sng" algn="ctr">
-                      <a:solidFill>
-                        <a:srgbClr val="666666"/>
-                      </a:solidFill>
-                      <a:prstDash val="solid"/>
-                      <a:round/>
-                      <a:headEnd type="none" w="med" len="med"/>
-                      <a:tailEnd type="none" w="med" len="med"/>
-                    </a:lnL>
-                    <a:lnR w="9525" cap="flat" cmpd="sng" algn="ctr">
-                      <a:solidFill>
-                        <a:srgbClr val="666666"/>
-                      </a:solidFill>
-                      <a:prstDash val="solid"/>
-                      <a:round/>
-                      <a:headEnd type="none" w="med" len="med"/>
-                      <a:tailEnd type="none" w="med" len="med"/>
-                    </a:lnR>
-                    <a:lnT w="9525" cap="flat" cmpd="sng" algn="ctr">
-                      <a:solidFill>
-                        <a:srgbClr val="666666"/>
-                      </a:solidFill>
-                      <a:prstDash val="solid"/>
-                      <a:round/>
-                      <a:headEnd type="none" w="med" len="med"/>
-                      <a:tailEnd type="none" w="med" len="med"/>
-                    </a:lnT>
-                    <a:lnB w="9525" cap="flat" cmpd="sng" algn="ctr">
-                      <a:solidFill>
-                        <a:srgbClr val="666666"/>
-                      </a:solidFill>
-                      <a:prstDash val="solid"/>
-                      <a:round/>
-                      <a:headEnd type="none" w="med" len="med"/>
-                      <a:tailEnd type="none" w="med" len="med"/>
-                    </a:lnB>
-                  </a:tcPr>
-                </a:tc>
-                <a:tc>
-                  <a:txBody>
-                    <a:bodyPr/>
-                    <a:lstStyle/>
-                    <a:p>
-                      <a:r>
-                        <a:rPr lang="zh-CN" altLang="en-US" sz="1700" b="1" dirty="0" smtClean="0">
-                          <a:effectLst/>
-                        </a:rPr>
-                        <a:t>描述</a:t>
-                      </a:r>
-                      <a:endParaRPr lang="en-US" sz="1700" dirty="0">
-                        <a:effectLst/>
-                      </a:endParaRPr>
-                    </a:p>
-                  </a:txBody>
-                  <a:tcPr marL="73818" marR="73818" marT="27682" marB="27682">
-                    <a:lnL w="9525" cap="flat" cmpd="sng" algn="ctr">
-                      <a:solidFill>
-                        <a:srgbClr val="666666"/>
-                      </a:solidFill>
-                      <a:prstDash val="solid"/>
-                      <a:round/>
-                      <a:headEnd type="none" w="med" len="med"/>
-                      <a:tailEnd type="none" w="med" len="med"/>
-                    </a:lnL>
-                    <a:lnR w="9525" cap="flat" cmpd="sng" algn="ctr">
-                      <a:solidFill>
-                        <a:srgbClr val="666666"/>
-                      </a:solidFill>
-                      <a:prstDash val="solid"/>
-                      <a:round/>
-                      <a:headEnd type="none" w="med" len="med"/>
-                      <a:tailEnd type="none" w="med" len="med"/>
-                    </a:lnR>
-                    <a:lnT w="9525" cap="flat" cmpd="sng" algn="ctr">
-                      <a:solidFill>
-                        <a:srgbClr val="666666"/>
-                      </a:solidFill>
-                      <a:prstDash val="solid"/>
-                      <a:round/>
-                      <a:headEnd type="none" w="med" len="med"/>
-                      <a:tailEnd type="none" w="med" len="med"/>
-                    </a:lnT>
-                    <a:lnB w="9525" cap="flat" cmpd="sng" algn="ctr">
-                      <a:solidFill>
-                        <a:srgbClr val="666666"/>
-                      </a:solidFill>
-                      <a:prstDash val="solid"/>
-                      <a:round/>
-                      <a:headEnd type="none" w="med" len="med"/>
-                      <a:tailEnd type="none" w="med" len="med"/>
-                    </a:lnB>
-                  </a:tcPr>
-                </a:tc>
-                <a:tc>
-                  <a:txBody>
-                    <a:bodyPr/>
-                    <a:lstStyle/>
-                    <a:p>
-                      <a:r>
-                        <a:rPr lang="en-US" sz="1700" b="1" dirty="0">
-                          <a:effectLst/>
-                        </a:rPr>
-                        <a:t>NOTE</a:t>
-                      </a:r>
-                      <a:endParaRPr lang="en-US" sz="1700" dirty="0">
-                        <a:effectLst/>
-                      </a:endParaRPr>
-                    </a:p>
-                  </a:txBody>
-                  <a:tcPr marL="73818" marR="73818" marT="27682" marB="27682">
-                    <a:lnL w="9525" cap="flat" cmpd="sng" algn="ctr">
-                      <a:solidFill>
-                        <a:srgbClr val="666666"/>
-                      </a:solidFill>
-                      <a:prstDash val="solid"/>
-                      <a:round/>
-                      <a:headEnd type="none" w="med" len="med"/>
-                      <a:tailEnd type="none" w="med" len="med"/>
-                    </a:lnL>
-                    <a:lnR w="9525" cap="flat" cmpd="sng" algn="ctr">
-                      <a:solidFill>
-                        <a:srgbClr val="666666"/>
-                      </a:solidFill>
-                      <a:prstDash val="solid"/>
-                      <a:round/>
-                      <a:headEnd type="none" w="med" len="med"/>
-                      <a:tailEnd type="none" w="med" len="med"/>
-                    </a:lnR>
-                    <a:lnT w="9525" cap="flat" cmpd="sng" algn="ctr">
-                      <a:solidFill>
-                        <a:srgbClr val="666666"/>
-                      </a:solidFill>
-                      <a:prstDash val="solid"/>
-                      <a:round/>
-                      <a:headEnd type="none" w="med" len="med"/>
-                      <a:tailEnd type="none" w="med" len="med"/>
-                    </a:lnT>
-                    <a:lnB w="9525" cap="flat" cmpd="sng" algn="ctr">
-                      <a:solidFill>
-                        <a:srgbClr val="666666"/>
-                      </a:solidFill>
-                      <a:prstDash val="solid"/>
-                      <a:round/>
-                      <a:headEnd type="none" w="med" len="med"/>
-                      <a:tailEnd type="none" w="med" len="med"/>
-                    </a:lnB>
-                  </a:tcPr>
-                </a:tc>
-              </a:tr>
-              <a:tr h="321108">
-                <a:tc>
-                  <a:txBody>
-                    <a:bodyPr/>
-                    <a:lstStyle/>
-                    <a:p>
-                      <a:r>
-                        <a:rPr lang="zh-CN" altLang="en-US" sz="1700" dirty="0" smtClean="0">
-                          <a:effectLst/>
-                        </a:rPr>
-                        <a:t>微服务粒度划分问题</a:t>
-                      </a:r>
-                      <a:endParaRPr lang="zh-CN" altLang="en-US" sz="1700" dirty="0">
-                        <a:effectLst/>
-                      </a:endParaRPr>
-                    </a:p>
-                  </a:txBody>
-                  <a:tcPr marL="73818" marR="73818" marT="27682" marB="27682">
-                    <a:lnL w="9525" cap="flat" cmpd="sng" algn="ctr">
-                      <a:solidFill>
-                        <a:srgbClr val="666666"/>
-                      </a:solidFill>
-                      <a:prstDash val="solid"/>
-                      <a:round/>
-                      <a:headEnd type="none" w="med" len="med"/>
-                      <a:tailEnd type="none" w="med" len="med"/>
-                    </a:lnL>
-                    <a:lnR w="9525" cap="flat" cmpd="sng" algn="ctr">
-                      <a:solidFill>
-                        <a:srgbClr val="666666"/>
-                      </a:solidFill>
-                      <a:prstDash val="solid"/>
-                      <a:round/>
-                      <a:headEnd type="none" w="med" len="med"/>
-                      <a:tailEnd type="none" w="med" len="med"/>
-                    </a:lnR>
-                    <a:lnT w="9525" cap="flat" cmpd="sng" algn="ctr">
-                      <a:solidFill>
-                        <a:srgbClr val="666666"/>
-                      </a:solidFill>
-                      <a:prstDash val="solid"/>
-                      <a:round/>
-                      <a:headEnd type="none" w="med" len="med"/>
-                      <a:tailEnd type="none" w="med" len="med"/>
-                    </a:lnT>
-                    <a:lnB w="9525" cap="flat" cmpd="sng" algn="ctr">
-                      <a:solidFill>
-                        <a:srgbClr val="666666"/>
-                      </a:solidFill>
-                      <a:prstDash val="solid"/>
-                      <a:round/>
-                      <a:headEnd type="none" w="med" len="med"/>
-                      <a:tailEnd type="none" w="med" len="med"/>
-                    </a:lnB>
-                  </a:tcPr>
-                </a:tc>
-                <a:tc>
-                  <a:txBody>
-                    <a:bodyPr/>
-                    <a:lstStyle/>
-                    <a:p>
-                      <a:endParaRPr lang="zh-CN" altLang="en-US" sz="1700" dirty="0">
-                        <a:effectLst/>
-                      </a:endParaRPr>
-                    </a:p>
-                  </a:txBody>
-                  <a:tcPr marL="73818" marR="73818" marT="27682" marB="27682">
-                    <a:lnL w="9525" cap="flat" cmpd="sng" algn="ctr">
-                      <a:solidFill>
-                        <a:srgbClr val="666666"/>
-                      </a:solidFill>
-                      <a:prstDash val="solid"/>
-                      <a:round/>
-                      <a:headEnd type="none" w="med" len="med"/>
-                      <a:tailEnd type="none" w="med" len="med"/>
-                    </a:lnL>
-                    <a:lnR w="9525" cap="flat" cmpd="sng" algn="ctr">
-                      <a:solidFill>
-                        <a:srgbClr val="666666"/>
-                      </a:solidFill>
-                      <a:prstDash val="solid"/>
-                      <a:round/>
-                      <a:headEnd type="none" w="med" len="med"/>
-                      <a:tailEnd type="none" w="med" len="med"/>
-                    </a:lnR>
-                    <a:lnT w="9525" cap="flat" cmpd="sng" algn="ctr">
-                      <a:solidFill>
-                        <a:srgbClr val="666666"/>
-                      </a:solidFill>
-                      <a:prstDash val="solid"/>
-                      <a:round/>
-                      <a:headEnd type="none" w="med" len="med"/>
-                      <a:tailEnd type="none" w="med" len="med"/>
-                    </a:lnT>
-                    <a:lnB w="9525" cap="flat" cmpd="sng" algn="ctr">
-                      <a:solidFill>
-                        <a:srgbClr val="666666"/>
-                      </a:solidFill>
-                      <a:prstDash val="solid"/>
-                      <a:round/>
-                      <a:headEnd type="none" w="med" len="med"/>
-                      <a:tailEnd type="none" w="med" len="med"/>
-                    </a:lnB>
-                  </a:tcPr>
-                </a:tc>
-                <a:tc>
-                  <a:txBody>
-                    <a:bodyPr/>
-                    <a:lstStyle/>
-                    <a:p>
-                      <a:endParaRPr lang="en-US" altLang="zh-CN" sz="1700" dirty="0" smtClean="0">
-                        <a:effectLst/>
-                      </a:endParaRPr>
-                    </a:p>
-                  </a:txBody>
-                  <a:tcPr marL="73818" marR="73818" marT="27682" marB="27682">
-                    <a:lnL w="9525" cap="flat" cmpd="sng" algn="ctr">
-                      <a:solidFill>
-                        <a:srgbClr val="666666"/>
-                      </a:solidFill>
-                      <a:prstDash val="solid"/>
-                      <a:round/>
-                      <a:headEnd type="none" w="med" len="med"/>
-                      <a:tailEnd type="none" w="med" len="med"/>
-                    </a:lnL>
-                    <a:lnR w="9525" cap="flat" cmpd="sng" algn="ctr">
-                      <a:solidFill>
-                        <a:srgbClr val="666666"/>
-                      </a:solidFill>
-                      <a:prstDash val="solid"/>
-                      <a:round/>
-                      <a:headEnd type="none" w="med" len="med"/>
-                      <a:tailEnd type="none" w="med" len="med"/>
-                    </a:lnR>
-                    <a:lnT w="9525" cap="flat" cmpd="sng" algn="ctr">
-                      <a:solidFill>
-                        <a:srgbClr val="666666"/>
-                      </a:solidFill>
-                      <a:prstDash val="solid"/>
-                      <a:round/>
-                      <a:headEnd type="none" w="med" len="med"/>
-                      <a:tailEnd type="none" w="med" len="med"/>
-                    </a:lnT>
-                    <a:lnB w="9525" cap="flat" cmpd="sng" algn="ctr">
-                      <a:solidFill>
-                        <a:srgbClr val="666666"/>
-                      </a:solidFill>
-                      <a:prstDash val="solid"/>
-                      <a:round/>
-                      <a:headEnd type="none" w="med" len="med"/>
-                      <a:tailEnd type="none" w="med" len="med"/>
-                    </a:lnB>
-                  </a:tcPr>
-                </a:tc>
-              </a:tr>
-              <a:tr h="321108">
-                <a:tc>
-                  <a:txBody>
-                    <a:bodyPr/>
-                    <a:lstStyle/>
-                    <a:p>
-                      <a:r>
-                        <a:rPr lang="zh-CN" altLang="en-US" sz="1700" dirty="0" smtClean="0">
-                          <a:effectLst/>
-                        </a:rPr>
-                        <a:t>数据库和缓存</a:t>
-                      </a:r>
-                      <a:endParaRPr lang="zh-CN" altLang="en-US" sz="1700" dirty="0">
-                        <a:effectLst/>
-                      </a:endParaRPr>
-                    </a:p>
-                  </a:txBody>
-                  <a:tcPr marL="73818" marR="73818" marT="27682" marB="27682">
-                    <a:lnL w="9525" cap="flat" cmpd="sng" algn="ctr">
-                      <a:solidFill>
-                        <a:srgbClr val="666666"/>
-                      </a:solidFill>
-                      <a:prstDash val="solid"/>
-                      <a:round/>
-                      <a:headEnd type="none" w="med" len="med"/>
-                      <a:tailEnd type="none" w="med" len="med"/>
-                    </a:lnL>
-                    <a:lnR w="9525" cap="flat" cmpd="sng" algn="ctr">
-                      <a:solidFill>
-                        <a:srgbClr val="666666"/>
-                      </a:solidFill>
-                      <a:prstDash val="solid"/>
-                      <a:round/>
-                      <a:headEnd type="none" w="med" len="med"/>
-                      <a:tailEnd type="none" w="med" len="med"/>
-                    </a:lnR>
-                    <a:lnT w="9525" cap="flat" cmpd="sng" algn="ctr">
-                      <a:solidFill>
-                        <a:srgbClr val="666666"/>
-                      </a:solidFill>
-                      <a:prstDash val="solid"/>
-                      <a:round/>
-                      <a:headEnd type="none" w="med" len="med"/>
-                      <a:tailEnd type="none" w="med" len="med"/>
-                    </a:lnT>
-                    <a:lnB w="9525" cap="flat" cmpd="sng" algn="ctr">
-                      <a:solidFill>
-                        <a:srgbClr val="666666"/>
-                      </a:solidFill>
-                      <a:prstDash val="solid"/>
-                      <a:round/>
-                      <a:headEnd type="none" w="med" len="med"/>
-                      <a:tailEnd type="none" w="med" len="med"/>
-                    </a:lnB>
-                  </a:tcPr>
-                </a:tc>
-                <a:tc>
-                  <a:txBody>
-                    <a:bodyPr/>
-                    <a:lstStyle/>
-                    <a:p>
-                      <a:r>
-                        <a:rPr lang="zh-CN" altLang="en-US" sz="1700" dirty="0" smtClean="0">
-                          <a:effectLst/>
-                        </a:rPr>
-                        <a:t>使用标准</a:t>
-                      </a:r>
-                      <a:endParaRPr lang="zh-CN" altLang="en-US" sz="1700" dirty="0">
-                        <a:effectLst/>
-                      </a:endParaRPr>
-                    </a:p>
-                  </a:txBody>
-                  <a:tcPr marL="73818" marR="73818" marT="27682" marB="27682">
-                    <a:lnL w="9525" cap="flat" cmpd="sng" algn="ctr">
-                      <a:solidFill>
-                        <a:srgbClr val="666666"/>
-                      </a:solidFill>
-                      <a:prstDash val="solid"/>
-                      <a:round/>
-                      <a:headEnd type="none" w="med" len="med"/>
-                      <a:tailEnd type="none" w="med" len="med"/>
-                    </a:lnL>
-                    <a:lnR w="9525" cap="flat" cmpd="sng" algn="ctr">
-                      <a:solidFill>
-                        <a:srgbClr val="666666"/>
-                      </a:solidFill>
-                      <a:prstDash val="solid"/>
-                      <a:round/>
-                      <a:headEnd type="none" w="med" len="med"/>
-                      <a:tailEnd type="none" w="med" len="med"/>
-                    </a:lnR>
-                    <a:lnT w="9525" cap="flat" cmpd="sng" algn="ctr">
-                      <a:solidFill>
-                        <a:srgbClr val="666666"/>
-                      </a:solidFill>
-                      <a:prstDash val="solid"/>
-                      <a:round/>
-                      <a:headEnd type="none" w="med" len="med"/>
-                      <a:tailEnd type="none" w="med" len="med"/>
-                    </a:lnT>
-                    <a:lnB w="9525" cap="flat" cmpd="sng" algn="ctr">
-                      <a:solidFill>
-                        <a:srgbClr val="666666"/>
-                      </a:solidFill>
-                      <a:prstDash val="solid"/>
-                      <a:round/>
-                      <a:headEnd type="none" w="med" len="med"/>
-                      <a:tailEnd type="none" w="med" len="med"/>
-                    </a:lnB>
-                  </a:tcPr>
-                </a:tc>
-                <a:tc>
-                  <a:txBody>
-                    <a:bodyPr/>
-                    <a:lstStyle/>
-                    <a:p>
-                      <a:endParaRPr lang="en-US" altLang="zh-CN" sz="1700" dirty="0" smtClean="0">
-                        <a:effectLst/>
-                      </a:endParaRPr>
-                    </a:p>
-                  </a:txBody>
-                  <a:tcPr marL="73818" marR="73818" marT="27682" marB="27682">
-                    <a:lnL w="9525" cap="flat" cmpd="sng" algn="ctr">
-                      <a:solidFill>
-                        <a:srgbClr val="666666"/>
-                      </a:solidFill>
-                      <a:prstDash val="solid"/>
-                      <a:round/>
-                      <a:headEnd type="none" w="med" len="med"/>
-                      <a:tailEnd type="none" w="med" len="med"/>
-                    </a:lnL>
-                    <a:lnR w="9525" cap="flat" cmpd="sng" algn="ctr">
-                      <a:solidFill>
-                        <a:srgbClr val="666666"/>
-                      </a:solidFill>
-                      <a:prstDash val="solid"/>
-                      <a:round/>
-                      <a:headEnd type="none" w="med" len="med"/>
-                      <a:tailEnd type="none" w="med" len="med"/>
-                    </a:lnR>
-                    <a:lnT w="9525" cap="flat" cmpd="sng" algn="ctr">
-                      <a:solidFill>
-                        <a:srgbClr val="666666"/>
-                      </a:solidFill>
-                      <a:prstDash val="solid"/>
-                      <a:round/>
-                      <a:headEnd type="none" w="med" len="med"/>
-                      <a:tailEnd type="none" w="med" len="med"/>
-                    </a:lnT>
-                    <a:lnB w="9525" cap="flat" cmpd="sng" algn="ctr">
-                      <a:solidFill>
-                        <a:srgbClr val="666666"/>
-                      </a:solidFill>
-                      <a:prstDash val="solid"/>
-                      <a:round/>
-                      <a:headEnd type="none" w="med" len="med"/>
-                      <a:tailEnd type="none" w="med" len="med"/>
-                    </a:lnB>
-                  </a:tcPr>
-                </a:tc>
-              </a:tr>
-              <a:tr h="321108">
-                <a:tc>
-                  <a:txBody>
-                    <a:bodyPr/>
-                    <a:lstStyle/>
-                    <a:p>
-                      <a:r>
-                        <a:rPr lang="en-US" altLang="zh-CN" sz="1700" dirty="0" smtClean="0">
-                          <a:effectLst/>
-                        </a:rPr>
-                        <a:t>SSO</a:t>
-                      </a:r>
-                      <a:endParaRPr lang="zh-CN" altLang="en-US" sz="1700" dirty="0">
-                        <a:effectLst/>
-                      </a:endParaRPr>
-                    </a:p>
-                  </a:txBody>
-                  <a:tcPr marL="73818" marR="73818" marT="27682" marB="27682">
-                    <a:lnL w="9525" cap="flat" cmpd="sng" algn="ctr">
-                      <a:solidFill>
-                        <a:srgbClr val="666666"/>
-                      </a:solidFill>
-                      <a:prstDash val="solid"/>
-                      <a:round/>
-                      <a:headEnd type="none" w="med" len="med"/>
-                      <a:tailEnd type="none" w="med" len="med"/>
-                    </a:lnL>
-                    <a:lnR w="9525" cap="flat" cmpd="sng" algn="ctr">
-                      <a:solidFill>
-                        <a:srgbClr val="666666"/>
-                      </a:solidFill>
-                      <a:prstDash val="solid"/>
-                      <a:round/>
-                      <a:headEnd type="none" w="med" len="med"/>
-                      <a:tailEnd type="none" w="med" len="med"/>
-                    </a:lnR>
-                    <a:lnT w="9525" cap="flat" cmpd="sng" algn="ctr">
-                      <a:solidFill>
-                        <a:srgbClr val="666666"/>
-                      </a:solidFill>
-                      <a:prstDash val="solid"/>
-                      <a:round/>
-                      <a:headEnd type="none" w="med" len="med"/>
-                      <a:tailEnd type="none" w="med" len="med"/>
-                    </a:lnT>
-                    <a:lnB w="9525" cap="flat" cmpd="sng" algn="ctr">
-                      <a:solidFill>
-                        <a:srgbClr val="666666"/>
-                      </a:solidFill>
-                      <a:prstDash val="solid"/>
-                      <a:round/>
-                      <a:headEnd type="none" w="med" len="med"/>
-                      <a:tailEnd type="none" w="med" len="med"/>
-                    </a:lnB>
-                  </a:tcPr>
-                </a:tc>
-                <a:tc>
-                  <a:txBody>
-                    <a:bodyPr/>
-                    <a:lstStyle/>
-                    <a:p>
-                      <a:endParaRPr lang="zh-CN" altLang="en-US" sz="1700" dirty="0">
-                        <a:effectLst/>
-                      </a:endParaRPr>
-                    </a:p>
-                  </a:txBody>
-                  <a:tcPr marL="73818" marR="73818" marT="27682" marB="27682">
-                    <a:lnL w="9525" cap="flat" cmpd="sng" algn="ctr">
-                      <a:solidFill>
-                        <a:srgbClr val="666666"/>
-                      </a:solidFill>
-                      <a:prstDash val="solid"/>
-                      <a:round/>
-                      <a:headEnd type="none" w="med" len="med"/>
-                      <a:tailEnd type="none" w="med" len="med"/>
-                    </a:lnL>
-                    <a:lnR w="9525" cap="flat" cmpd="sng" algn="ctr">
-                      <a:solidFill>
-                        <a:srgbClr val="666666"/>
-                      </a:solidFill>
-                      <a:prstDash val="solid"/>
-                      <a:round/>
-                      <a:headEnd type="none" w="med" len="med"/>
-                      <a:tailEnd type="none" w="med" len="med"/>
-                    </a:lnR>
-                    <a:lnT w="9525" cap="flat" cmpd="sng" algn="ctr">
-                      <a:solidFill>
-                        <a:srgbClr val="666666"/>
-                      </a:solidFill>
-                      <a:prstDash val="solid"/>
-                      <a:round/>
-                      <a:headEnd type="none" w="med" len="med"/>
-                      <a:tailEnd type="none" w="med" len="med"/>
-                    </a:lnT>
-                    <a:lnB w="9525" cap="flat" cmpd="sng" algn="ctr">
-                      <a:solidFill>
-                        <a:srgbClr val="666666"/>
-                      </a:solidFill>
-                      <a:prstDash val="solid"/>
-                      <a:round/>
-                      <a:headEnd type="none" w="med" len="med"/>
-                      <a:tailEnd type="none" w="med" len="med"/>
-                    </a:lnB>
-                  </a:tcPr>
-                </a:tc>
-                <a:tc>
-                  <a:txBody>
-                    <a:bodyPr/>
-                    <a:lstStyle/>
-                    <a:p>
-                      <a:endParaRPr lang="en-US" altLang="zh-CN" sz="1700" dirty="0" smtClean="0">
-                        <a:effectLst/>
-                      </a:endParaRPr>
-                    </a:p>
-                  </a:txBody>
-                  <a:tcPr marL="73818" marR="73818" marT="27682" marB="27682">
-                    <a:lnL w="9525" cap="flat" cmpd="sng" algn="ctr">
-                      <a:solidFill>
-                        <a:srgbClr val="666666"/>
-                      </a:solidFill>
-                      <a:prstDash val="solid"/>
-                      <a:round/>
-                      <a:headEnd type="none" w="med" len="med"/>
-                      <a:tailEnd type="none" w="med" len="med"/>
-                    </a:lnL>
-                    <a:lnR w="9525" cap="flat" cmpd="sng" algn="ctr">
-                      <a:solidFill>
-                        <a:srgbClr val="666666"/>
-                      </a:solidFill>
-                      <a:prstDash val="solid"/>
-                      <a:round/>
-                      <a:headEnd type="none" w="med" len="med"/>
-                      <a:tailEnd type="none" w="med" len="med"/>
-                    </a:lnR>
-                    <a:lnT w="9525" cap="flat" cmpd="sng" algn="ctr">
-                      <a:solidFill>
-                        <a:srgbClr val="666666"/>
-                      </a:solidFill>
-                      <a:prstDash val="solid"/>
-                      <a:round/>
-                      <a:headEnd type="none" w="med" len="med"/>
-                      <a:tailEnd type="none" w="med" len="med"/>
-                    </a:lnT>
-                    <a:lnB w="9525" cap="flat" cmpd="sng" algn="ctr">
-                      <a:solidFill>
-                        <a:srgbClr val="666666"/>
-                      </a:solidFill>
-                      <a:prstDash val="solid"/>
-                      <a:round/>
-                      <a:headEnd type="none" w="med" len="med"/>
-                      <a:tailEnd type="none" w="med" len="med"/>
-                    </a:lnB>
-                  </a:tcPr>
-                </a:tc>
-              </a:tr>
-              <a:tr h="321108">
-                <a:tc>
-                  <a:txBody>
-                    <a:bodyPr/>
-                    <a:lstStyle/>
-                    <a:p>
-                      <a:r>
-                        <a:rPr lang="en-US" altLang="zh-CN" sz="1700" dirty="0" err="1" smtClean="0">
-                          <a:effectLst/>
-                        </a:rPr>
-                        <a:t>RabbitMQ</a:t>
-                      </a:r>
-                      <a:endParaRPr lang="zh-CN" altLang="en-US" sz="1700" dirty="0">
-                        <a:effectLst/>
-                      </a:endParaRPr>
-                    </a:p>
-                  </a:txBody>
-                  <a:tcPr marL="73818" marR="73818" marT="27682" marB="27682">
-                    <a:lnL w="9525" cap="flat" cmpd="sng" algn="ctr">
-                      <a:solidFill>
-                        <a:srgbClr val="666666"/>
-                      </a:solidFill>
-                      <a:prstDash val="solid"/>
-                      <a:round/>
-                      <a:headEnd type="none" w="med" len="med"/>
-                      <a:tailEnd type="none" w="med" len="med"/>
-                    </a:lnL>
-                    <a:lnR w="9525" cap="flat" cmpd="sng" algn="ctr">
-                      <a:solidFill>
-                        <a:srgbClr val="666666"/>
-                      </a:solidFill>
-                      <a:prstDash val="solid"/>
-                      <a:round/>
-                      <a:headEnd type="none" w="med" len="med"/>
-                      <a:tailEnd type="none" w="med" len="med"/>
-                    </a:lnR>
-                    <a:lnT w="9525" cap="flat" cmpd="sng" algn="ctr">
-                      <a:solidFill>
-                        <a:srgbClr val="666666"/>
-                      </a:solidFill>
-                      <a:prstDash val="solid"/>
-                      <a:round/>
-                      <a:headEnd type="none" w="med" len="med"/>
-                      <a:tailEnd type="none" w="med" len="med"/>
-                    </a:lnT>
-                    <a:lnB w="9525" cap="flat" cmpd="sng" algn="ctr">
-                      <a:solidFill>
-                        <a:srgbClr val="666666"/>
-                      </a:solidFill>
-                      <a:prstDash val="solid"/>
-                      <a:round/>
-                      <a:headEnd type="none" w="med" len="med"/>
-                      <a:tailEnd type="none" w="med" len="med"/>
-                    </a:lnB>
-                  </a:tcPr>
-                </a:tc>
-                <a:tc>
-                  <a:txBody>
-                    <a:bodyPr/>
-                    <a:lstStyle/>
-                    <a:p>
-                      <a:r>
-                        <a:rPr lang="zh-CN" altLang="en-US" sz="1700" dirty="0" smtClean="0">
-                          <a:effectLst/>
-                        </a:rPr>
-                        <a:t>异步消息处理</a:t>
-                      </a:r>
-                      <a:endParaRPr lang="zh-CN" altLang="en-US" sz="1700" dirty="0">
-                        <a:effectLst/>
-                      </a:endParaRPr>
-                    </a:p>
-                  </a:txBody>
-                  <a:tcPr marL="73818" marR="73818" marT="27682" marB="27682">
-                    <a:lnL w="9525" cap="flat" cmpd="sng" algn="ctr">
-                      <a:solidFill>
-                        <a:srgbClr val="666666"/>
-                      </a:solidFill>
-                      <a:prstDash val="solid"/>
-                      <a:round/>
-                      <a:headEnd type="none" w="med" len="med"/>
-                      <a:tailEnd type="none" w="med" len="med"/>
-                    </a:lnL>
-                    <a:lnR w="9525" cap="flat" cmpd="sng" algn="ctr">
-                      <a:solidFill>
-                        <a:srgbClr val="666666"/>
-                      </a:solidFill>
-                      <a:prstDash val="solid"/>
-                      <a:round/>
-                      <a:headEnd type="none" w="med" len="med"/>
-                      <a:tailEnd type="none" w="med" len="med"/>
-                    </a:lnR>
-                    <a:lnT w="9525" cap="flat" cmpd="sng" algn="ctr">
-                      <a:solidFill>
-                        <a:srgbClr val="666666"/>
-                      </a:solidFill>
-                      <a:prstDash val="solid"/>
-                      <a:round/>
-                      <a:headEnd type="none" w="med" len="med"/>
-                      <a:tailEnd type="none" w="med" len="med"/>
-                    </a:lnT>
-                    <a:lnB w="9525" cap="flat" cmpd="sng" algn="ctr">
-                      <a:solidFill>
-                        <a:srgbClr val="666666"/>
-                      </a:solidFill>
-                      <a:prstDash val="solid"/>
-                      <a:round/>
-                      <a:headEnd type="none" w="med" len="med"/>
-                      <a:tailEnd type="none" w="med" len="med"/>
-                    </a:lnB>
-                  </a:tcPr>
-                </a:tc>
-                <a:tc>
-                  <a:txBody>
-                    <a:bodyPr/>
-                    <a:lstStyle/>
-                    <a:p>
-                      <a:endParaRPr lang="en-US" altLang="zh-CN" sz="1700" dirty="0" smtClean="0">
-                        <a:effectLst/>
-                      </a:endParaRPr>
-                    </a:p>
-                  </a:txBody>
-                  <a:tcPr marL="73818" marR="73818" marT="27682" marB="27682">
-                    <a:lnL w="9525" cap="flat" cmpd="sng" algn="ctr">
-                      <a:solidFill>
-                        <a:srgbClr val="666666"/>
-                      </a:solidFill>
-                      <a:prstDash val="solid"/>
-                      <a:round/>
-                      <a:headEnd type="none" w="med" len="med"/>
-                      <a:tailEnd type="none" w="med" len="med"/>
-                    </a:lnL>
-                    <a:lnR w="9525" cap="flat" cmpd="sng" algn="ctr">
-                      <a:solidFill>
-                        <a:srgbClr val="666666"/>
-                      </a:solidFill>
-                      <a:prstDash val="solid"/>
-                      <a:round/>
-                      <a:headEnd type="none" w="med" len="med"/>
-                      <a:tailEnd type="none" w="med" len="med"/>
-                    </a:lnR>
-                    <a:lnT w="9525" cap="flat" cmpd="sng" algn="ctr">
-                      <a:solidFill>
-                        <a:srgbClr val="666666"/>
-                      </a:solidFill>
-                      <a:prstDash val="solid"/>
-                      <a:round/>
-                      <a:headEnd type="none" w="med" len="med"/>
-                      <a:tailEnd type="none" w="med" len="med"/>
-                    </a:lnT>
-                    <a:lnB w="9525" cap="flat" cmpd="sng" algn="ctr">
-                      <a:solidFill>
-                        <a:srgbClr val="666666"/>
-                      </a:solidFill>
-                      <a:prstDash val="solid"/>
-                      <a:round/>
-                      <a:headEnd type="none" w="med" len="med"/>
-                      <a:tailEnd type="none" w="med" len="med"/>
-                    </a:lnB>
-                  </a:tcPr>
-                </a:tc>
-              </a:tr>
-            </a:tbl>
-          </a:graphicData>
-        </a:graphic>
-      </p:graphicFrame>
+      <p:pic>
+        <p:nvPicPr>
+          <p:cNvPr id="2" name="图片 1"/>
+          <p:cNvPicPr>
+            <a:picLocks noChangeAspect="1"/>
+          </p:cNvPicPr>
+          <p:nvPr/>
+        </p:nvPicPr>
+        <p:blipFill>
+          <a:blip r:embed="rId3"/>
+          <a:stretch>
+            <a:fillRect/>
+          </a:stretch>
+        </p:blipFill>
+        <p:spPr>
+          <a:xfrm>
+            <a:off x="1913352" y="1369467"/>
+            <a:ext cx="3467554" cy="3818437"/>
+          </a:xfrm>
+          <a:prstGeom prst="rect">
+            <a:avLst/>
+          </a:prstGeom>
+        </p:spPr>
+      </p:pic>
+      <p:pic>
+        <p:nvPicPr>
+          <p:cNvPr id="3" name="图片 2"/>
+          <p:cNvPicPr>
+            <a:picLocks noChangeAspect="1"/>
+          </p:cNvPicPr>
+          <p:nvPr/>
+        </p:nvPicPr>
+        <p:blipFill>
+          <a:blip r:embed="rId4"/>
+          <a:stretch>
+            <a:fillRect/>
+          </a:stretch>
+        </p:blipFill>
+        <p:spPr>
+          <a:xfrm>
+            <a:off x="6625133" y="210988"/>
+            <a:ext cx="3412776" cy="6483350"/>
+          </a:xfrm>
+          <a:prstGeom prst="rect">
+            <a:avLst/>
+          </a:prstGeom>
+        </p:spPr>
+      </p:pic>
     </p:spTree>
     <p:extLst>
       <p:ext uri="{BB962C8B-B14F-4D97-AF65-F5344CB8AC3E}">
-        <p14:creationId xmlns:p14="http://schemas.microsoft.com/office/powerpoint/2010/main" val="1410930156"/>
+        <p14:creationId xmlns:p14="http://schemas.microsoft.com/office/powerpoint/2010/main" val="1567986065"/>
       </p:ext>
     </p:extLst>
   </p:cSld>

</xml_diff>